<commit_message>
yard, stockpile and WB flow ppt
</commit_message>
<xml_diff>
--- a/Weigh_Bridge_Management_SRS/weighbridge-flow.pptx
+++ b/Weigh_Bridge_Management_SRS/weighbridge-flow.pptx
@@ -11,8 +11,6 @@
     <p:sldId id="256" r:id="rId6"/>
     <p:sldId id="257" r:id="rId7"/>
     <p:sldId id="258" r:id="rId8"/>
-    <p:sldId id="259" r:id="rId9"/>
-    <p:sldId id="260" r:id="rId10"/>
   </p:sldIdLst>
   <p:sldSz cy="5143500" cx="9144000"/>
   <p:notesSz cx="6858000" cy="9144000"/>
@@ -961,7 +959,7 @@
       </p:grpSpPr>
       <p:sp>
         <p:nvSpPr>
-          <p:cNvPr id="56" name="Google Shape;56;gb1f2b7014e_0_5:notes"/>
+          <p:cNvPr id="56" name="Google Shape;56;p2:notes"/>
           <p:cNvSpPr/>
           <p:nvPr>
             <p:ph idx="2" type="sldImg"/>
@@ -1006,7 +1004,7 @@
       </p:sp>
       <p:sp>
         <p:nvSpPr>
-          <p:cNvPr id="57" name="Google Shape;57;gb1f2b7014e_0_5:notes"/>
+          <p:cNvPr id="57" name="Google Shape;57;p2:notes"/>
           <p:cNvSpPr txBox="1"/>
           <p:nvPr>
             <p:ph idx="1" type="body"/>
@@ -1064,7 +1062,7 @@
   <p:cSld>
     <p:spTree>
       <p:nvGrpSpPr>
-        <p:cNvPr id="67" name="Shape 67"/>
+        <p:cNvPr id="82" name="Shape 82"/>
         <p:cNvGrpSpPr/>
         <p:nvPr/>
       </p:nvGrpSpPr>
@@ -1078,7 +1076,7 @@
       </p:grpSpPr>
       <p:sp>
         <p:nvSpPr>
-          <p:cNvPr id="68" name="Google Shape;68;gb1f2b7014e_0_16:notes"/>
+          <p:cNvPr id="83" name="Google Shape;83;p5:notes"/>
           <p:cNvSpPr/>
           <p:nvPr>
             <p:ph idx="2" type="sldImg"/>
@@ -1109,11 +1107,21 @@
               </a:path>
             </a:pathLst>
           </a:custGeom>
+          <a:noFill/>
+          <a:ln cap="flat" cmpd="sng" w="9525">
+            <a:solidFill>
+              <a:srgbClr val="000000"/>
+            </a:solidFill>
+            <a:prstDash val="solid"/>
+            <a:round/>
+            <a:headEnd len="sm" w="sm" type="none"/>
+            <a:tailEnd len="sm" w="sm" type="none"/>
+          </a:ln>
         </p:spPr>
       </p:sp>
       <p:sp>
         <p:nvSpPr>
-          <p:cNvPr id="69" name="Google Shape;69;gb1f2b7014e_0_16:notes"/>
+          <p:cNvPr id="84" name="Google Shape;84;p5:notes"/>
           <p:cNvSpPr txBox="1"/>
           <p:nvPr>
             <p:ph idx="1" type="body"/>
@@ -1127,6 +1135,10 @@
           <a:prstGeom prst="rect">
             <a:avLst/>
           </a:prstGeom>
+          <a:noFill/>
+          <a:ln>
+            <a:noFill/>
+          </a:ln>
         </p:spPr>
         <p:txBody>
           <a:bodyPr anchorCtr="0" anchor="t" bIns="91425" lIns="91425" spcFirstLastPara="1" rIns="91425" wrap="square" tIns="91425">
@@ -1135,210 +1147,16 @@
           <a:lstStyle/>
           <a:p>
             <a:pPr indent="0" lvl="0" marL="0" rtl="0" algn="l">
-              <a:spcBef>
-                <a:spcPts val="0"/>
-              </a:spcBef>
-              <a:spcAft>
-                <a:spcPts val="0"/>
-              </a:spcAft>
-              <a:buNone/>
-            </a:pPr>
-            <a:r>
-              <a:t/>
-            </a:r>
-            <a:endParaRPr/>
-          </a:p>
-        </p:txBody>
-      </p:sp>
-    </p:spTree>
-  </p:cSld>
-  <p:clrMapOvr>
-    <a:masterClrMapping/>
-  </p:clrMapOvr>
-</p:notes>
-</file>
-
-<file path=ppt/notesSlides/notesSlide4.xml><?xml version="1.0" encoding="utf-8"?>
-<p:notes xmlns:a="http://schemas.openxmlformats.org/drawingml/2006/main" xmlns:r="http://schemas.openxmlformats.org/officeDocument/2006/relationships" xmlns:mc="http://schemas.openxmlformats.org/markup-compatibility/2006" xmlns:mv="urn:schemas-microsoft-com:mac:vml" xmlns:p="http://schemas.openxmlformats.org/presentationml/2006/main" xmlns:c="http://schemas.openxmlformats.org/drawingml/2006/chart" xmlns:dgm="http://schemas.openxmlformats.org/drawingml/2006/diagram" xmlns:o="urn:schemas-microsoft-com:office:office" xmlns:v="urn:schemas-microsoft-com:vml" xmlns:pvml="urn:schemas-microsoft-com:office:powerpoint" xmlns:com="http://schemas.openxmlformats.org/drawingml/2006/compatibility" xmlns:p14="http://schemas.microsoft.com/office/powerpoint/2010/main" xmlns:p15="http://schemas.microsoft.com/office/powerpoint/2012/main" xmlns:ahyp="http://schemas.microsoft.com/office/drawing/2018/hyperlinkcolor" showMasterPhAnim="0" showMasterSp="0">
-  <p:cSld>
-    <p:spTree>
-      <p:nvGrpSpPr>
-        <p:cNvPr id="80" name="Shape 80"/>
-        <p:cNvGrpSpPr/>
-        <p:nvPr/>
-      </p:nvGrpSpPr>
-      <p:grpSpPr>
-        <a:xfrm>
-          <a:off x="0" y="0"/>
-          <a:ext cx="0" cy="0"/>
-          <a:chOff x="0" y="0"/>
-          <a:chExt cx="0" cy="0"/>
-        </a:xfrm>
-      </p:grpSpPr>
-      <p:sp>
-        <p:nvSpPr>
-          <p:cNvPr id="81" name="Google Shape;81;gb1f2b7014e_0_51:notes"/>
-          <p:cNvSpPr/>
-          <p:nvPr>
-            <p:ph idx="2" type="sldImg"/>
-          </p:nvPr>
-        </p:nvSpPr>
-        <p:spPr>
-          <a:xfrm>
-            <a:off x="381300" y="685800"/>
-            <a:ext cx="6096000" cy="3429000"/>
-          </a:xfrm>
-          <a:custGeom>
-            <a:rect b="b" l="l" r="r" t="t"/>
-            <a:pathLst>
-              <a:path extrusionOk="0" h="120000" w="120000">
-                <a:moveTo>
-                  <a:pt x="0" y="0"/>
-                </a:moveTo>
-                <a:lnTo>
-                  <a:pt x="120000" y="0"/>
-                </a:lnTo>
-                <a:lnTo>
-                  <a:pt x="120000" y="120000"/>
-                </a:lnTo>
-                <a:lnTo>
-                  <a:pt x="0" y="120000"/>
-                </a:lnTo>
-                <a:close/>
-              </a:path>
-            </a:pathLst>
-          </a:custGeom>
-        </p:spPr>
-      </p:sp>
-      <p:sp>
-        <p:nvSpPr>
-          <p:cNvPr id="82" name="Google Shape;82;gb1f2b7014e_0_51:notes"/>
-          <p:cNvSpPr txBox="1"/>
-          <p:nvPr>
-            <p:ph idx="1" type="body"/>
-          </p:nvPr>
-        </p:nvSpPr>
-        <p:spPr>
-          <a:xfrm>
-            <a:off x="685800" y="4343400"/>
-            <a:ext cx="5486400" cy="4114800"/>
-          </a:xfrm>
-          <a:prstGeom prst="rect">
-            <a:avLst/>
-          </a:prstGeom>
-        </p:spPr>
-        <p:txBody>
-          <a:bodyPr anchorCtr="0" anchor="t" bIns="91425" lIns="91425" spcFirstLastPara="1" rIns="91425" wrap="square" tIns="91425">
-            <a:noAutofit/>
-          </a:bodyPr>
-          <a:lstStyle/>
-          <a:p>
-            <a:pPr indent="0" lvl="0" marL="0" rtl="0" algn="l">
-              <a:spcBef>
-                <a:spcPts val="0"/>
-              </a:spcBef>
-              <a:spcAft>
-                <a:spcPts val="0"/>
-              </a:spcAft>
-              <a:buNone/>
-            </a:pPr>
-            <a:r>
-              <a:t/>
-            </a:r>
-            <a:endParaRPr/>
-          </a:p>
-        </p:txBody>
-      </p:sp>
-    </p:spTree>
-  </p:cSld>
-  <p:clrMapOvr>
-    <a:masterClrMapping/>
-  </p:clrMapOvr>
-</p:notes>
-</file>
-
-<file path=ppt/notesSlides/notesSlide5.xml><?xml version="1.0" encoding="utf-8"?>
-<p:notes xmlns:a="http://schemas.openxmlformats.org/drawingml/2006/main" xmlns:r="http://schemas.openxmlformats.org/officeDocument/2006/relationships" xmlns:mc="http://schemas.openxmlformats.org/markup-compatibility/2006" xmlns:mv="urn:schemas-microsoft-com:mac:vml" xmlns:p="http://schemas.openxmlformats.org/presentationml/2006/main" xmlns:c="http://schemas.openxmlformats.org/drawingml/2006/chart" xmlns:dgm="http://schemas.openxmlformats.org/drawingml/2006/diagram" xmlns:o="urn:schemas-microsoft-com:office:office" xmlns:v="urn:schemas-microsoft-com:vml" xmlns:pvml="urn:schemas-microsoft-com:office:powerpoint" xmlns:com="http://schemas.openxmlformats.org/drawingml/2006/compatibility" xmlns:p14="http://schemas.microsoft.com/office/powerpoint/2010/main" xmlns:p15="http://schemas.microsoft.com/office/powerpoint/2012/main" xmlns:ahyp="http://schemas.microsoft.com/office/drawing/2018/hyperlinkcolor" showMasterPhAnim="0" showMasterSp="0">
-  <p:cSld>
-    <p:spTree>
-      <p:nvGrpSpPr>
-        <p:cNvPr id="90" name="Shape 90"/>
-        <p:cNvGrpSpPr/>
-        <p:nvPr/>
-      </p:nvGrpSpPr>
-      <p:grpSpPr>
-        <a:xfrm>
-          <a:off x="0" y="0"/>
-          <a:ext cx="0" cy="0"/>
-          <a:chOff x="0" y="0"/>
-          <a:chExt cx="0" cy="0"/>
-        </a:xfrm>
-      </p:grpSpPr>
-      <p:sp>
-        <p:nvSpPr>
-          <p:cNvPr id="91" name="Google Shape;91;gb1f2b7014e_0_108:notes"/>
-          <p:cNvSpPr/>
-          <p:nvPr>
-            <p:ph idx="2" type="sldImg"/>
-          </p:nvPr>
-        </p:nvSpPr>
-        <p:spPr>
-          <a:xfrm>
-            <a:off x="381300" y="685800"/>
-            <a:ext cx="6096000" cy="3429000"/>
-          </a:xfrm>
-          <a:custGeom>
-            <a:rect b="b" l="l" r="r" t="t"/>
-            <a:pathLst>
-              <a:path extrusionOk="0" h="120000" w="120000">
-                <a:moveTo>
-                  <a:pt x="0" y="0"/>
-                </a:moveTo>
-                <a:lnTo>
-                  <a:pt x="120000" y="0"/>
-                </a:lnTo>
-                <a:lnTo>
-                  <a:pt x="120000" y="120000"/>
-                </a:lnTo>
-                <a:lnTo>
-                  <a:pt x="0" y="120000"/>
-                </a:lnTo>
-                <a:close/>
-              </a:path>
-            </a:pathLst>
-          </a:custGeom>
-        </p:spPr>
-      </p:sp>
-      <p:sp>
-        <p:nvSpPr>
-          <p:cNvPr id="92" name="Google Shape;92;gb1f2b7014e_0_108:notes"/>
-          <p:cNvSpPr txBox="1"/>
-          <p:nvPr>
-            <p:ph idx="1" type="body"/>
-          </p:nvPr>
-        </p:nvSpPr>
-        <p:spPr>
-          <a:xfrm>
-            <a:off x="685800" y="4343400"/>
-            <a:ext cx="5486400" cy="4114800"/>
-          </a:xfrm>
-          <a:prstGeom prst="rect">
-            <a:avLst/>
-          </a:prstGeom>
-        </p:spPr>
-        <p:txBody>
-          <a:bodyPr anchorCtr="0" anchor="t" bIns="91425" lIns="91425" spcFirstLastPara="1" rIns="91425" wrap="square" tIns="91425">
-            <a:noAutofit/>
-          </a:bodyPr>
-          <a:lstStyle/>
-          <a:p>
-            <a:pPr indent="0" lvl="0" marL="0" rtl="0" algn="l">
-              <a:spcBef>
-                <a:spcPts val="0"/>
-              </a:spcBef>
-              <a:spcAft>
-                <a:spcPts val="0"/>
-              </a:spcAft>
+              <a:lnSpc>
+                <a:spcPct val="100000"/>
+              </a:lnSpc>
+              <a:spcBef>
+                <a:spcPts val="0"/>
+              </a:spcBef>
+              <a:spcAft>
+                <a:spcPts val="0"/>
+              </a:spcAft>
+              <a:buSzPts val="1100"/>
               <a:buNone/>
             </a:pPr>
             <a:r>
@@ -9097,7 +8915,7 @@
         </p:nvSpPr>
         <p:spPr>
           <a:xfrm>
-            <a:off x="402825" y="1141500"/>
+            <a:off x="-80625" y="-183800"/>
             <a:ext cx="1450500" cy="537300"/>
           </a:xfrm>
           <a:prstGeom prst="rect">
@@ -9132,20 +8950,8 @@
               <a:buNone/>
             </a:pPr>
             <a:r>
-              <a:rPr b="0" i="0" lang="en" sz="1400" u="none" cap="none" strike="noStrike">
-                <a:solidFill>
-                  <a:srgbClr val="000000"/>
-                </a:solidFill>
-                <a:latin typeface="Arial"/>
-                <a:ea typeface="Arial"/>
-                <a:cs typeface="Arial"/>
-                <a:sym typeface="Arial"/>
-              </a:rPr>
-              <a:t>Add </a:t>
-            </a:r>
-            <a:r>
               <a:rPr lang="en"/>
-              <a:t>Weighbridge</a:t>
+              <a:t>Add and edit weighbridge</a:t>
             </a:r>
             <a:endParaRPr b="0" i="0" sz="1400" u="none" cap="none" strike="noStrike">
               <a:solidFill>
@@ -9167,7 +8973,7 @@
         </p:nvSpPr>
         <p:spPr>
           <a:xfrm>
-            <a:off x="308925" y="1742475"/>
+            <a:off x="0" y="353500"/>
             <a:ext cx="2121900" cy="1282500"/>
           </a:xfrm>
           <a:prstGeom prst="roundRect">
@@ -9180,7 +8986,7 @@
           </a:solidFill>
           <a:ln cap="flat" cmpd="sng" w="9525">
             <a:solidFill>
-              <a:schemeClr val="dk2"/>
+              <a:srgbClr val="595959"/>
             </a:solidFill>
             <a:prstDash val="solid"/>
             <a:round/>
@@ -9212,21 +9018,102 @@
               <a:buNone/>
             </a:pPr>
             <a:r>
-              <a:rPr b="0" i="0" lang="en" sz="1400" u="none" cap="none" strike="noStrike">
-                <a:solidFill>
-                  <a:srgbClr val="000000"/>
-                </a:solidFill>
-                <a:latin typeface="Arial"/>
-                <a:ea typeface="Arial"/>
-                <a:cs typeface="Arial"/>
-                <a:sym typeface="Arial"/>
-              </a:rPr>
-              <a:t>User can create a new </a:t>
+              <a:rPr lang="en"/>
+              <a:t>Enter the weighbridge parameters.</a:t>
             </a:r>
-            <a:r>
-              <a:rPr lang="en"/>
-              <a:t>weighbridge</a:t>
-            </a:r>
+            <a:endParaRPr b="0" i="0" sz="1400" u="none" cap="none" strike="noStrike">
+              <a:solidFill>
+                <a:srgbClr val="000000"/>
+              </a:solidFill>
+              <a:latin typeface="Arial"/>
+              <a:ea typeface="Arial"/>
+              <a:cs typeface="Arial"/>
+              <a:sym typeface="Arial"/>
+            </a:endParaRPr>
+          </a:p>
+        </p:txBody>
+      </p:sp>
+      <p:cxnSp>
+        <p:nvCxnSpPr>
+          <p:cNvPr id="61" name="Google Shape;61;p14"/>
+          <p:cNvCxnSpPr>
+            <a:stCxn id="60" idx="3"/>
+            <a:endCxn id="62" idx="1"/>
+          </p:cNvCxnSpPr>
+          <p:nvPr/>
+        </p:nvCxnSpPr>
+        <p:spPr>
+          <a:xfrm flipH="1" rot="10800000">
+            <a:off x="2121900" y="920950"/>
+            <a:ext cx="684900" cy="73800"/>
+          </a:xfrm>
+          <a:prstGeom prst="straightConnector1">
+            <a:avLst/>
+          </a:prstGeom>
+          <a:noFill/>
+          <a:ln cap="flat" cmpd="sng" w="9525">
+            <a:solidFill>
+              <a:srgbClr val="595959"/>
+            </a:solidFill>
+            <a:prstDash val="solid"/>
+            <a:round/>
+            <a:headEnd len="sm" w="sm" type="none"/>
+            <a:tailEnd len="med" w="med" type="triangle"/>
+          </a:ln>
+        </p:spPr>
+      </p:cxnSp>
+      <p:sp>
+        <p:nvSpPr>
+          <p:cNvPr id="63" name="Google Shape;63;p14"/>
+          <p:cNvSpPr/>
+          <p:nvPr/>
+        </p:nvSpPr>
+        <p:spPr>
+          <a:xfrm>
+            <a:off x="5367350" y="2230050"/>
+            <a:ext cx="786000" cy="1057200"/>
+          </a:xfrm>
+          <a:prstGeom prst="can">
+            <a:avLst>
+              <a:gd fmla="val 25000" name="adj"/>
+            </a:avLst>
+          </a:prstGeom>
+          <a:solidFill>
+            <a:srgbClr val="A4C2F4"/>
+          </a:solidFill>
+          <a:ln cap="flat" cmpd="sng" w="9525">
+            <a:solidFill>
+              <a:srgbClr val="595959"/>
+            </a:solidFill>
+            <a:prstDash val="solid"/>
+            <a:round/>
+            <a:headEnd len="sm" w="sm" type="none"/>
+            <a:tailEnd len="sm" w="sm" type="none"/>
+          </a:ln>
+        </p:spPr>
+        <p:txBody>
+          <a:bodyPr anchorCtr="0" anchor="ctr" bIns="91425" lIns="91425" spcFirstLastPara="1" rIns="91425" wrap="square" tIns="91425">
+            <a:noAutofit/>
+          </a:bodyPr>
+          <a:lstStyle/>
+          <a:p>
+            <a:pPr indent="0" lvl="0" marL="0" marR="0" rtl="0" algn="ctr">
+              <a:lnSpc>
+                <a:spcPct val="100000"/>
+              </a:lnSpc>
+              <a:spcBef>
+                <a:spcPts val="0"/>
+              </a:spcBef>
+              <a:spcAft>
+                <a:spcPts val="0"/>
+              </a:spcAft>
+              <a:buClr>
+                <a:srgbClr val="000000"/>
+              </a:buClr>
+              <a:buSzPts val="1400"/>
+              <a:buFont typeface="Arial"/>
+              <a:buNone/>
+            </a:pPr>
             <a:r>
               <a:rPr b="0" i="0" lang="en" sz="1400" u="none" cap="none" strike="noStrike">
                 <a:solidFill>
@@ -9237,7 +9124,7 @@
                 <a:cs typeface="Arial"/>
                 <a:sym typeface="Arial"/>
               </a:rPr>
-              <a:t> from the UI. This is persisted in the DB</a:t>
+              <a:t>DB</a:t>
             </a:r>
             <a:endParaRPr b="0" i="0" sz="1400" u="none" cap="none" strike="noStrike">
               <a:solidFill>
@@ -9253,14 +9140,14 @@
       </p:sp>
       <p:sp>
         <p:nvSpPr>
-          <p:cNvPr id="61" name="Google Shape;61;p14"/>
+          <p:cNvPr id="64" name="Google Shape;64;p14"/>
           <p:cNvSpPr/>
           <p:nvPr/>
         </p:nvSpPr>
         <p:spPr>
           <a:xfrm>
-            <a:off x="2994775" y="1574700"/>
-            <a:ext cx="2618700" cy="1527600"/>
+            <a:off x="6453050" y="441775"/>
+            <a:ext cx="2003700" cy="1057200"/>
           </a:xfrm>
           <a:prstGeom prst="roundRect">
             <a:avLst>
@@ -9272,7 +9159,7 @@
           </a:solidFill>
           <a:ln cap="flat" cmpd="sng" w="9525">
             <a:solidFill>
-              <a:schemeClr val="dk2"/>
+              <a:srgbClr val="595959"/>
             </a:solidFill>
             <a:prstDash val="solid"/>
             <a:round/>
@@ -9297,7 +9184,7 @@
             </a:pPr>
             <a:r>
               <a:rPr lang="en"/>
-              <a:t>If weighbridge name already exists, there will be an error displayed on the UI conveying the same.</a:t>
+              <a:t>Error message with name “weighbridge already exists” </a:t>
             </a:r>
             <a:endParaRPr/>
           </a:p>
@@ -9305,17 +9192,17 @@
       </p:sp>
       <p:cxnSp>
         <p:nvCxnSpPr>
-          <p:cNvPr id="62" name="Google Shape;62;p14"/>
+          <p:cNvPr id="65" name="Google Shape;65;p14"/>
           <p:cNvCxnSpPr>
-            <a:stCxn id="60" idx="3"/>
-            <a:endCxn id="61" idx="1"/>
+            <a:stCxn id="62" idx="3"/>
+            <a:endCxn id="64" idx="1"/>
           </p:cNvCxnSpPr>
           <p:nvPr/>
         </p:nvCxnSpPr>
         <p:spPr>
-          <a:xfrm flipH="1" rot="10800000">
-            <a:off x="2430825" y="2338425"/>
-            <a:ext cx="564000" cy="45300"/>
+          <a:xfrm>
+            <a:off x="5502350" y="920825"/>
+            <a:ext cx="950700" cy="49500"/>
           </a:xfrm>
           <a:prstGeom prst="straightConnector1">
             <a:avLst/>
@@ -9323,7 +9210,7 @@
           <a:noFill/>
           <a:ln cap="flat" cmpd="sng" w="9525">
             <a:solidFill>
-              <a:schemeClr val="dk2"/>
+              <a:srgbClr val="595959"/>
             </a:solidFill>
             <a:prstDash val="solid"/>
             <a:round/>
@@ -9334,26 +9221,139 @@
       </p:cxnSp>
       <p:sp>
         <p:nvSpPr>
-          <p:cNvPr id="63" name="Google Shape;63;p14"/>
+          <p:cNvPr id="66" name="Google Shape;66;p14"/>
+          <p:cNvSpPr txBox="1"/>
+          <p:nvPr/>
+        </p:nvSpPr>
+        <p:spPr>
+          <a:xfrm>
+            <a:off x="5711500" y="362875"/>
+            <a:ext cx="684900" cy="410100"/>
+          </a:xfrm>
+          <a:prstGeom prst="rect">
+            <a:avLst/>
+          </a:prstGeom>
+          <a:noFill/>
+          <a:ln>
+            <a:noFill/>
+          </a:ln>
+        </p:spPr>
+        <p:txBody>
+          <a:bodyPr anchorCtr="0" anchor="t" bIns="91425" lIns="91425" spcFirstLastPara="1" rIns="91425" wrap="square" tIns="91425">
+            <a:noAutofit/>
+          </a:bodyPr>
+          <a:lstStyle/>
+          <a:p>
+            <a:pPr indent="0" lvl="0" marL="0" rtl="0" algn="l">
+              <a:spcBef>
+                <a:spcPts val="0"/>
+              </a:spcBef>
+              <a:spcAft>
+                <a:spcPts val="0"/>
+              </a:spcAft>
+              <a:buNone/>
+            </a:pPr>
+            <a:r>
+              <a:rPr lang="en"/>
+              <a:t>yes</a:t>
+            </a:r>
+            <a:endParaRPr/>
+          </a:p>
+        </p:txBody>
+      </p:sp>
+      <p:cxnSp>
+        <p:nvCxnSpPr>
+          <p:cNvPr id="67" name="Google Shape;67;p14"/>
+          <p:cNvCxnSpPr>
+            <a:stCxn id="62" idx="2"/>
+            <a:endCxn id="68" idx="0"/>
+          </p:cNvCxnSpPr>
+          <p:nvPr/>
+        </p:nvCxnSpPr>
+        <p:spPr>
+          <a:xfrm flipH="1">
+            <a:off x="4075675" y="1562075"/>
+            <a:ext cx="78900" cy="734400"/>
+          </a:xfrm>
+          <a:prstGeom prst="straightConnector1">
+            <a:avLst/>
+          </a:prstGeom>
+          <a:noFill/>
+          <a:ln cap="flat" cmpd="sng" w="9525">
+            <a:solidFill>
+              <a:srgbClr val="595959"/>
+            </a:solidFill>
+            <a:prstDash val="solid"/>
+            <a:round/>
+            <a:headEnd len="med" w="med" type="none"/>
+            <a:tailEnd len="med" w="med" type="triangle"/>
+          </a:ln>
+        </p:spPr>
+      </p:cxnSp>
+      <p:sp>
+        <p:nvSpPr>
+          <p:cNvPr id="69" name="Google Shape;69;p14"/>
+          <p:cNvSpPr txBox="1"/>
+          <p:nvPr/>
+        </p:nvSpPr>
+        <p:spPr>
+          <a:xfrm>
+            <a:off x="4154575" y="1660618"/>
+            <a:ext cx="567900" cy="537300"/>
+          </a:xfrm>
+          <a:prstGeom prst="rect">
+            <a:avLst/>
+          </a:prstGeom>
+          <a:noFill/>
+          <a:ln>
+            <a:noFill/>
+          </a:ln>
+        </p:spPr>
+        <p:txBody>
+          <a:bodyPr anchorCtr="0" anchor="t" bIns="91425" lIns="91425" spcFirstLastPara="1" rIns="91425" wrap="square" tIns="91425">
+            <a:noAutofit/>
+          </a:bodyPr>
+          <a:lstStyle/>
+          <a:p>
+            <a:pPr indent="0" lvl="0" marL="0" rtl="0" algn="l">
+              <a:spcBef>
+                <a:spcPts val="0"/>
+              </a:spcBef>
+              <a:spcAft>
+                <a:spcPts val="0"/>
+              </a:spcAft>
+              <a:buNone/>
+            </a:pPr>
+            <a:r>
+              <a:rPr lang="en"/>
+              <a:t>no</a:t>
+            </a:r>
+            <a:endParaRPr/>
+          </a:p>
+        </p:txBody>
+      </p:sp>
+      <p:sp>
+        <p:nvSpPr>
+          <p:cNvPr id="70" name="Google Shape;70;p14"/>
           <p:cNvSpPr/>
           <p:nvPr/>
         </p:nvSpPr>
         <p:spPr>
           <a:xfrm>
-            <a:off x="7426425" y="2326750"/>
-            <a:ext cx="1235400" cy="1745700"/>
+            <a:off x="120225" y="3616200"/>
+            <a:ext cx="2242800" cy="1396800"/>
           </a:xfrm>
-          <a:prstGeom prst="can">
+          <a:prstGeom prst="roundRect">
             <a:avLst>
-              <a:gd fmla="val 25000" name="adj"/>
+              <a:gd fmla="val 16667" name="adj"/>
             </a:avLst>
           </a:prstGeom>
           <a:solidFill>
-            <a:srgbClr val="A4C2F4"/>
+            <a:srgbClr val="6AA84F"/>
           </a:solidFill>
           <a:ln cap="flat" cmpd="sng" w="9525">
             <a:solidFill>
-              <a:schemeClr val="dk2"/>
+              <a:srgbClr val="595959"/>
             </a:solidFill>
             <a:prstDash val="solid"/>
             <a:round/>
@@ -9367,45 +9367,59 @@
           </a:bodyPr>
           <a:lstStyle/>
           <a:p>
-            <a:pPr indent="0" lvl="0" marL="0" rtl="0" algn="ctr">
-              <a:spcBef>
-                <a:spcPts val="0"/>
-              </a:spcBef>
-              <a:spcAft>
-                <a:spcPts val="0"/>
-              </a:spcAft>
+            <a:pPr indent="0" lvl="0" marL="0" marR="0" rtl="0" algn="l">
+              <a:lnSpc>
+                <a:spcPct val="100000"/>
+              </a:lnSpc>
+              <a:spcBef>
+                <a:spcPts val="0"/>
+              </a:spcBef>
+              <a:spcAft>
+                <a:spcPts val="0"/>
+              </a:spcAft>
+              <a:buClr>
+                <a:srgbClr val="000000"/>
+              </a:buClr>
+              <a:buSzPts val="1400"/>
+              <a:buFont typeface="Arial"/>
               <a:buNone/>
             </a:pPr>
             <a:r>
               <a:rPr lang="en"/>
-              <a:t>DB</a:t>
+              <a:t>Edit the weighbridge parameters</a:t>
             </a:r>
-            <a:endParaRPr/>
+            <a:endParaRPr b="0" i="0" sz="1400" u="none" cap="none" strike="noStrike">
+              <a:solidFill>
+                <a:srgbClr val="000000"/>
+              </a:solidFill>
+              <a:latin typeface="Arial"/>
+              <a:ea typeface="Arial"/>
+              <a:cs typeface="Arial"/>
+              <a:sym typeface="Arial"/>
+            </a:endParaRPr>
           </a:p>
         </p:txBody>
       </p:sp>
       <p:sp>
         <p:nvSpPr>
-          <p:cNvPr id="64" name="Google Shape;64;p14"/>
+          <p:cNvPr id="62" name="Google Shape;62;p14"/>
           <p:cNvSpPr/>
           <p:nvPr/>
         </p:nvSpPr>
         <p:spPr>
           <a:xfrm>
-            <a:off x="2994775" y="3448075"/>
-            <a:ext cx="2242800" cy="1282500"/>
+            <a:off x="2806800" y="279575"/>
+            <a:ext cx="2695550" cy="1282500"/>
           </a:xfrm>
-          <a:prstGeom prst="roundRect">
-            <a:avLst>
-              <a:gd fmla="val 16667" name="adj"/>
-            </a:avLst>
+          <a:prstGeom prst="flowChartDecision">
+            <a:avLst/>
           </a:prstGeom>
           <a:solidFill>
-            <a:srgbClr val="6AA84F"/>
+            <a:srgbClr val="6D9EEB"/>
           </a:solidFill>
           <a:ln cap="flat" cmpd="sng" w="9525">
             <a:solidFill>
-              <a:schemeClr val="dk2"/>
+              <a:srgbClr val="595959"/>
             </a:solidFill>
             <a:prstDash val="solid"/>
             <a:round/>
@@ -9429,19 +9443,51 @@
               <a:buNone/>
             </a:pPr>
             <a:r>
-              <a:rPr lang="en">
-                <a:solidFill>
-                  <a:schemeClr val="dk1"/>
-                </a:solidFill>
-              </a:rPr>
-              <a:t> if the weighbridge name already exists but is inactive, it will allow it to be created..</a:t>
+              <a:rPr lang="en"/>
+              <a:t>weighbridge</a:t>
             </a:r>
-            <a:endParaRPr>
-              <a:solidFill>
-                <a:schemeClr val="dk1"/>
-              </a:solidFill>
-            </a:endParaRPr>
+            <a:r>
+              <a:rPr lang="en"/>
+              <a:t> name already exists and active</a:t>
+            </a:r>
+            <a:endParaRPr/>
           </a:p>
+        </p:txBody>
+      </p:sp>
+      <p:sp>
+        <p:nvSpPr>
+          <p:cNvPr id="71" name="Google Shape;71;p14"/>
+          <p:cNvSpPr/>
+          <p:nvPr/>
+        </p:nvSpPr>
+        <p:spPr>
+          <a:xfrm>
+            <a:off x="7250700" y="2153950"/>
+            <a:ext cx="1893300" cy="1396800"/>
+          </a:xfrm>
+          <a:prstGeom prst="roundRect">
+            <a:avLst>
+              <a:gd fmla="val 16667" name="adj"/>
+            </a:avLst>
+          </a:prstGeom>
+          <a:solidFill>
+            <a:srgbClr val="6AA84F"/>
+          </a:solidFill>
+          <a:ln cap="flat" cmpd="sng" w="9525">
+            <a:solidFill>
+              <a:srgbClr val="595959"/>
+            </a:solidFill>
+            <a:prstDash val="solid"/>
+            <a:round/>
+            <a:headEnd len="sm" w="sm" type="none"/>
+            <a:tailEnd len="sm" w="sm" type="none"/>
+          </a:ln>
+        </p:spPr>
+        <p:txBody>
+          <a:bodyPr anchorCtr="0" anchor="ctr" bIns="91425" lIns="91425" spcFirstLastPara="1" rIns="91425" wrap="square" tIns="91425">
+            <a:noAutofit/>
+          </a:bodyPr>
+          <a:lstStyle/>
           <a:p>
             <a:pPr indent="0" lvl="0" marL="0" rtl="0" algn="l">
               <a:spcBef>
@@ -9453,7 +9499,60 @@
               <a:buNone/>
             </a:pPr>
             <a:r>
-              <a:t/>
+              <a:rPr lang="en"/>
+              <a:t>Select the weighbridge, edit the parameters </a:t>
+            </a:r>
+            <a:endParaRPr/>
+          </a:p>
+        </p:txBody>
+      </p:sp>
+      <p:sp>
+        <p:nvSpPr>
+          <p:cNvPr id="68" name="Google Shape;68;p14"/>
+          <p:cNvSpPr/>
+          <p:nvPr/>
+        </p:nvSpPr>
+        <p:spPr>
+          <a:xfrm>
+            <a:off x="3518550" y="2296450"/>
+            <a:ext cx="1114500" cy="1111800"/>
+          </a:xfrm>
+          <a:prstGeom prst="roundRect">
+            <a:avLst>
+              <a:gd fmla="val 16667" name="adj"/>
+            </a:avLst>
+          </a:prstGeom>
+          <a:solidFill>
+            <a:srgbClr val="6D9EEB"/>
+          </a:solidFill>
+          <a:ln cap="flat" cmpd="sng" w="9525">
+            <a:solidFill>
+              <a:srgbClr val="595959"/>
+            </a:solidFill>
+            <a:prstDash val="solid"/>
+            <a:round/>
+            <a:headEnd len="sm" w="sm" type="none"/>
+            <a:tailEnd len="sm" w="sm" type="none"/>
+          </a:ln>
+        </p:spPr>
+        <p:txBody>
+          <a:bodyPr anchorCtr="0" anchor="ctr" bIns="91425" lIns="91425" spcFirstLastPara="1" rIns="91425" wrap="square" tIns="91425">
+            <a:noAutofit/>
+          </a:bodyPr>
+          <a:lstStyle/>
+          <a:p>
+            <a:pPr indent="0" lvl="0" marL="0" rtl="0" algn="l">
+              <a:spcBef>
+                <a:spcPts val="0"/>
+              </a:spcBef>
+              <a:spcAft>
+                <a:spcPts val="0"/>
+              </a:spcAft>
+              <a:buNone/>
+            </a:pPr>
+            <a:r>
+              <a:rPr lang="en"/>
+              <a:t>Success message “weighbridge is created”</a:t>
             </a:r>
             <a:endParaRPr/>
           </a:p>
@@ -9461,17 +9560,17 @@
       </p:sp>
       <p:cxnSp>
         <p:nvCxnSpPr>
-          <p:cNvPr id="65" name="Google Shape;65;p14"/>
+          <p:cNvPr id="72" name="Google Shape;72;p14"/>
           <p:cNvCxnSpPr>
-            <a:stCxn id="60" idx="2"/>
-            <a:endCxn id="64" idx="1"/>
+            <a:stCxn id="68" idx="3"/>
+            <a:endCxn id="63" idx="2"/>
           </p:cNvCxnSpPr>
           <p:nvPr/>
         </p:nvCxnSpPr>
         <p:spPr>
-          <a:xfrm>
-            <a:off x="1369875" y="3024975"/>
-            <a:ext cx="1624800" cy="1064400"/>
+          <a:xfrm flipH="1" rot="10800000">
+            <a:off x="4633050" y="2758750"/>
+            <a:ext cx="734400" cy="93600"/>
           </a:xfrm>
           <a:prstGeom prst="straightConnector1">
             <a:avLst/>
@@ -9479,7 +9578,280 @@
           <a:noFill/>
           <a:ln cap="flat" cmpd="sng" w="9525">
             <a:solidFill>
-              <a:schemeClr val="dk2"/>
+              <a:srgbClr val="595959"/>
+            </a:solidFill>
+            <a:prstDash val="solid"/>
+            <a:round/>
+            <a:headEnd len="med" w="med" type="none"/>
+            <a:tailEnd len="med" w="med" type="triangle"/>
+          </a:ln>
+        </p:spPr>
+      </p:cxnSp>
+      <p:sp>
+        <p:nvSpPr>
+          <p:cNvPr id="73" name="Google Shape;73;p14"/>
+          <p:cNvSpPr/>
+          <p:nvPr/>
+        </p:nvSpPr>
+        <p:spPr>
+          <a:xfrm>
+            <a:off x="3464800" y="3840850"/>
+            <a:ext cx="1893300" cy="1057200"/>
+          </a:xfrm>
+          <a:prstGeom prst="flowChartDecision">
+            <a:avLst/>
+          </a:prstGeom>
+          <a:solidFill>
+            <a:srgbClr val="6D9EEB"/>
+          </a:solidFill>
+          <a:ln cap="flat" cmpd="sng" w="9525">
+            <a:solidFill>
+              <a:srgbClr val="595959"/>
+            </a:solidFill>
+            <a:prstDash val="solid"/>
+            <a:round/>
+            <a:headEnd len="sm" w="sm" type="none"/>
+            <a:tailEnd len="sm" w="sm" type="none"/>
+          </a:ln>
+        </p:spPr>
+        <p:txBody>
+          <a:bodyPr anchorCtr="0" anchor="ctr" bIns="91425" lIns="91425" spcFirstLastPara="1" rIns="91425" wrap="square" tIns="91425">
+            <a:noAutofit/>
+          </a:bodyPr>
+          <a:lstStyle/>
+          <a:p>
+            <a:pPr indent="0" lvl="0" marL="0" rtl="0" algn="l">
+              <a:spcBef>
+                <a:spcPts val="0"/>
+              </a:spcBef>
+              <a:spcAft>
+                <a:spcPts val="0"/>
+              </a:spcAft>
+              <a:buNone/>
+            </a:pPr>
+            <a:r>
+              <a:rPr lang="en"/>
+              <a:t>Edit weighbridge or delete?</a:t>
+            </a:r>
+            <a:endParaRPr/>
+          </a:p>
+        </p:txBody>
+      </p:sp>
+      <p:cxnSp>
+        <p:nvCxnSpPr>
+          <p:cNvPr id="74" name="Google Shape;74;p14"/>
+          <p:cNvCxnSpPr>
+            <a:stCxn id="73" idx="3"/>
+            <a:endCxn id="71" idx="1"/>
+          </p:cNvCxnSpPr>
+          <p:nvPr/>
+        </p:nvCxnSpPr>
+        <p:spPr>
+          <a:xfrm flipH="1" rot="10800000">
+            <a:off x="5358100" y="2852350"/>
+            <a:ext cx="1892700" cy="1517100"/>
+          </a:xfrm>
+          <a:prstGeom prst="straightConnector1">
+            <a:avLst/>
+          </a:prstGeom>
+          <a:noFill/>
+          <a:ln cap="flat" cmpd="sng" w="9525">
+            <a:solidFill>
+              <a:srgbClr val="595959"/>
+            </a:solidFill>
+            <a:prstDash val="solid"/>
+            <a:round/>
+            <a:headEnd len="med" w="med" type="none"/>
+            <a:tailEnd len="med" w="med" type="triangle"/>
+          </a:ln>
+        </p:spPr>
+      </p:cxnSp>
+      <p:sp>
+        <p:nvSpPr>
+          <p:cNvPr id="75" name="Google Shape;75;p14"/>
+          <p:cNvSpPr txBox="1"/>
+          <p:nvPr/>
+        </p:nvSpPr>
+        <p:spPr>
+          <a:xfrm>
+            <a:off x="5502350" y="3616200"/>
+            <a:ext cx="734400" cy="537300"/>
+          </a:xfrm>
+          <a:prstGeom prst="rect">
+            <a:avLst/>
+          </a:prstGeom>
+          <a:noFill/>
+          <a:ln>
+            <a:noFill/>
+          </a:ln>
+        </p:spPr>
+        <p:txBody>
+          <a:bodyPr anchorCtr="0" anchor="t" bIns="91425" lIns="91425" spcFirstLastPara="1" rIns="91425" wrap="square" tIns="91425">
+            <a:noAutofit/>
+          </a:bodyPr>
+          <a:lstStyle/>
+          <a:p>
+            <a:pPr indent="0" lvl="0" marL="0" rtl="0" algn="l">
+              <a:spcBef>
+                <a:spcPts val="0"/>
+              </a:spcBef>
+              <a:spcAft>
+                <a:spcPts val="0"/>
+              </a:spcAft>
+              <a:buNone/>
+            </a:pPr>
+            <a:r>
+              <a:rPr lang="en"/>
+              <a:t>edit</a:t>
+            </a:r>
+            <a:endParaRPr/>
+          </a:p>
+        </p:txBody>
+      </p:sp>
+      <p:sp>
+        <p:nvSpPr>
+          <p:cNvPr id="76" name="Google Shape;76;p14"/>
+          <p:cNvSpPr/>
+          <p:nvPr/>
+        </p:nvSpPr>
+        <p:spPr>
+          <a:xfrm>
+            <a:off x="7184775" y="4002000"/>
+            <a:ext cx="1893300" cy="1057200"/>
+          </a:xfrm>
+          <a:prstGeom prst="roundRect">
+            <a:avLst>
+              <a:gd fmla="val 16667" name="adj"/>
+            </a:avLst>
+          </a:prstGeom>
+          <a:solidFill>
+            <a:srgbClr val="6AA84F"/>
+          </a:solidFill>
+          <a:ln cap="flat" cmpd="sng" w="9525">
+            <a:solidFill>
+              <a:srgbClr val="595959"/>
+            </a:solidFill>
+            <a:prstDash val="solid"/>
+            <a:round/>
+            <a:headEnd len="sm" w="sm" type="none"/>
+            <a:tailEnd len="sm" w="sm" type="none"/>
+          </a:ln>
+        </p:spPr>
+        <p:txBody>
+          <a:bodyPr anchorCtr="0" anchor="ctr" bIns="91425" lIns="91425" spcFirstLastPara="1" rIns="91425" wrap="square" tIns="91425">
+            <a:noAutofit/>
+          </a:bodyPr>
+          <a:lstStyle/>
+          <a:p>
+            <a:pPr indent="0" lvl="0" marL="0" rtl="0" algn="l">
+              <a:spcBef>
+                <a:spcPts val="0"/>
+              </a:spcBef>
+              <a:spcAft>
+                <a:spcPts val="0"/>
+              </a:spcAft>
+              <a:buNone/>
+            </a:pPr>
+            <a:r>
+              <a:rPr lang="en"/>
+              <a:t>Delete the weighbridge</a:t>
+            </a:r>
+            <a:endParaRPr/>
+          </a:p>
+        </p:txBody>
+      </p:sp>
+      <p:cxnSp>
+        <p:nvCxnSpPr>
+          <p:cNvPr id="77" name="Google Shape;77;p14"/>
+          <p:cNvCxnSpPr>
+            <a:stCxn id="73" idx="3"/>
+            <a:endCxn id="76" idx="1"/>
+          </p:cNvCxnSpPr>
+          <p:nvPr/>
+        </p:nvCxnSpPr>
+        <p:spPr>
+          <a:xfrm>
+            <a:off x="5358100" y="4369450"/>
+            <a:ext cx="1826700" cy="161100"/>
+          </a:xfrm>
+          <a:prstGeom prst="straightConnector1">
+            <a:avLst/>
+          </a:prstGeom>
+          <a:noFill/>
+          <a:ln cap="flat" cmpd="sng" w="9525">
+            <a:solidFill>
+              <a:srgbClr val="595959"/>
+            </a:solidFill>
+            <a:prstDash val="solid"/>
+            <a:round/>
+            <a:headEnd len="med" w="med" type="none"/>
+            <a:tailEnd len="med" w="med" type="none"/>
+          </a:ln>
+        </p:spPr>
+      </p:cxnSp>
+      <p:sp>
+        <p:nvSpPr>
+          <p:cNvPr id="78" name="Google Shape;78;p14"/>
+          <p:cNvSpPr txBox="1"/>
+          <p:nvPr/>
+        </p:nvSpPr>
+        <p:spPr>
+          <a:xfrm>
+            <a:off x="6080325" y="4002000"/>
+            <a:ext cx="786000" cy="658200"/>
+          </a:xfrm>
+          <a:prstGeom prst="rect">
+            <a:avLst/>
+          </a:prstGeom>
+          <a:noFill/>
+          <a:ln>
+            <a:noFill/>
+          </a:ln>
+        </p:spPr>
+        <p:txBody>
+          <a:bodyPr anchorCtr="0" anchor="t" bIns="91425" lIns="91425" spcFirstLastPara="1" rIns="91425" wrap="square" tIns="91425">
+            <a:noAutofit/>
+          </a:bodyPr>
+          <a:lstStyle/>
+          <a:p>
+            <a:pPr indent="0" lvl="0" marL="0" rtl="0" algn="l">
+              <a:spcBef>
+                <a:spcPts val="0"/>
+              </a:spcBef>
+              <a:spcAft>
+                <a:spcPts val="0"/>
+              </a:spcAft>
+              <a:buNone/>
+            </a:pPr>
+            <a:r>
+              <a:rPr lang="en"/>
+              <a:t>Delete</a:t>
+            </a:r>
+            <a:endParaRPr/>
+          </a:p>
+        </p:txBody>
+      </p:sp>
+      <p:cxnSp>
+        <p:nvCxnSpPr>
+          <p:cNvPr id="79" name="Google Shape;79;p14"/>
+          <p:cNvCxnSpPr>
+            <a:stCxn id="71" idx="1"/>
+            <a:endCxn id="63" idx="4"/>
+          </p:cNvCxnSpPr>
+          <p:nvPr/>
+        </p:nvCxnSpPr>
+        <p:spPr>
+          <a:xfrm rot="10800000">
+            <a:off x="6153300" y="2758750"/>
+            <a:ext cx="1097400" cy="93600"/>
+          </a:xfrm>
+          <a:prstGeom prst="straightConnector1">
+            <a:avLst/>
+          </a:prstGeom>
+          <a:noFill/>
+          <a:ln cap="flat" cmpd="sng" w="9525">
+            <a:solidFill>
+              <a:srgbClr val="595959"/>
             </a:solidFill>
             <a:prstDash val="solid"/>
             <a:round/>
@@ -9490,17 +9862,17 @@
       </p:cxnSp>
       <p:cxnSp>
         <p:nvCxnSpPr>
-          <p:cNvPr id="66" name="Google Shape;66;p14"/>
+          <p:cNvPr id="80" name="Google Shape;80;p14"/>
           <p:cNvCxnSpPr>
-            <a:stCxn id="64" idx="3"/>
-            <a:endCxn id="63" idx="2"/>
+            <a:stCxn id="76" idx="1"/>
+            <a:endCxn id="63" idx="4"/>
           </p:cNvCxnSpPr>
           <p:nvPr/>
         </p:nvCxnSpPr>
         <p:spPr>
-          <a:xfrm flipH="1" rot="10800000">
-            <a:off x="5237575" y="3199525"/>
-            <a:ext cx="2188800" cy="889800"/>
+          <a:xfrm rot="10800000">
+            <a:off x="6153375" y="2758800"/>
+            <a:ext cx="1031400" cy="1771800"/>
           </a:xfrm>
           <a:prstGeom prst="straightConnector1">
             <a:avLst/>
@@ -9508,7 +9880,36 @@
           <a:noFill/>
           <a:ln cap="flat" cmpd="sng" w="9525">
             <a:solidFill>
-              <a:schemeClr val="dk2"/>
+              <a:srgbClr val="595959"/>
+            </a:solidFill>
+            <a:prstDash val="solid"/>
+            <a:round/>
+            <a:headEnd len="med" w="med" type="none"/>
+            <a:tailEnd len="med" w="med" type="triangle"/>
+          </a:ln>
+        </p:spPr>
+      </p:cxnSp>
+      <p:cxnSp>
+        <p:nvCxnSpPr>
+          <p:cNvPr id="81" name="Google Shape;81;p14"/>
+          <p:cNvCxnSpPr>
+            <a:stCxn id="70" idx="3"/>
+            <a:endCxn id="73" idx="1"/>
+          </p:cNvCxnSpPr>
+          <p:nvPr/>
+        </p:nvCxnSpPr>
+        <p:spPr>
+          <a:xfrm>
+            <a:off x="2363025" y="4314600"/>
+            <a:ext cx="1101900" cy="54900"/>
+          </a:xfrm>
+          <a:prstGeom prst="straightConnector1">
+            <a:avLst/>
+          </a:prstGeom>
+          <a:noFill/>
+          <a:ln cap="flat" cmpd="sng" w="9525">
+            <a:solidFill>
+              <a:srgbClr val="595959"/>
             </a:solidFill>
             <a:prstDash val="solid"/>
             <a:round/>
@@ -9530,7 +9931,7 @@
   <p:cSld>
     <p:spTree>
       <p:nvGrpSpPr>
-        <p:cNvPr id="70" name="Shape 70"/>
+        <p:cNvPr id="85" name="Shape 85"/>
         <p:cNvGrpSpPr/>
         <p:nvPr/>
       </p:nvGrpSpPr>
@@ -9544,871 +9945,7 @@
       </p:grpSpPr>
       <p:sp>
         <p:nvSpPr>
-          <p:cNvPr id="71" name="Google Shape;71;p15"/>
-          <p:cNvSpPr txBox="1"/>
-          <p:nvPr/>
-        </p:nvSpPr>
-        <p:spPr>
-          <a:xfrm>
-            <a:off x="295450" y="134300"/>
-            <a:ext cx="1504200" cy="537300"/>
-          </a:xfrm>
-          <a:prstGeom prst="rect">
-            <a:avLst/>
-          </a:prstGeom>
-          <a:noFill/>
-          <a:ln>
-            <a:noFill/>
-          </a:ln>
-        </p:spPr>
-        <p:txBody>
-          <a:bodyPr anchorCtr="0" anchor="t" bIns="91425" lIns="91425" spcFirstLastPara="1" rIns="91425" wrap="square" tIns="91425">
-            <a:noAutofit/>
-          </a:bodyPr>
-          <a:lstStyle/>
-          <a:p>
-            <a:pPr indent="0" lvl="0" marL="0" marR="0" rtl="0" algn="l">
-              <a:lnSpc>
-                <a:spcPct val="100000"/>
-              </a:lnSpc>
-              <a:spcBef>
-                <a:spcPts val="0"/>
-              </a:spcBef>
-              <a:spcAft>
-                <a:spcPts val="0"/>
-              </a:spcAft>
-              <a:buClr>
-                <a:srgbClr val="000000"/>
-              </a:buClr>
-              <a:buSzPts val="1400"/>
-              <a:buFont typeface="Arial"/>
-              <a:buNone/>
-            </a:pPr>
-            <a:r>
-              <a:rPr lang="en"/>
-              <a:t>Edit Weighbridge</a:t>
-            </a:r>
-            <a:endParaRPr b="0" i="0" sz="1400" u="none" cap="none" strike="noStrike">
-              <a:solidFill>
-                <a:srgbClr val="000000"/>
-              </a:solidFill>
-              <a:latin typeface="Arial"/>
-              <a:ea typeface="Arial"/>
-              <a:cs typeface="Arial"/>
-              <a:sym typeface="Arial"/>
-            </a:endParaRPr>
-          </a:p>
-        </p:txBody>
-      </p:sp>
-      <p:sp>
-        <p:nvSpPr>
-          <p:cNvPr id="72" name="Google Shape;72;p15"/>
-          <p:cNvSpPr/>
-          <p:nvPr/>
-        </p:nvSpPr>
-        <p:spPr>
-          <a:xfrm>
-            <a:off x="214875" y="839350"/>
-            <a:ext cx="2242800" cy="1396800"/>
-          </a:xfrm>
-          <a:prstGeom prst="roundRect">
-            <a:avLst>
-              <a:gd fmla="val 16667" name="adj"/>
-            </a:avLst>
-          </a:prstGeom>
-          <a:solidFill>
-            <a:srgbClr val="6AA84F"/>
-          </a:solidFill>
-          <a:ln cap="flat" cmpd="sng" w="9525">
-            <a:solidFill>
-              <a:schemeClr val="dk2"/>
-            </a:solidFill>
-            <a:prstDash val="solid"/>
-            <a:round/>
-            <a:headEnd len="sm" w="sm" type="none"/>
-            <a:tailEnd len="sm" w="sm" type="none"/>
-          </a:ln>
-        </p:spPr>
-        <p:txBody>
-          <a:bodyPr anchorCtr="0" anchor="ctr" bIns="91425" lIns="91425" spcFirstLastPara="1" rIns="91425" wrap="square" tIns="91425">
-            <a:noAutofit/>
-          </a:bodyPr>
-          <a:lstStyle/>
-          <a:p>
-            <a:pPr indent="0" lvl="0" marL="0" marR="0" rtl="0" algn="l">
-              <a:lnSpc>
-                <a:spcPct val="100000"/>
-              </a:lnSpc>
-              <a:spcBef>
-                <a:spcPts val="0"/>
-              </a:spcBef>
-              <a:spcAft>
-                <a:spcPts val="0"/>
-              </a:spcAft>
-              <a:buClr>
-                <a:srgbClr val="000000"/>
-              </a:buClr>
-              <a:buSzPts val="1400"/>
-              <a:buFont typeface="Arial"/>
-              <a:buNone/>
-            </a:pPr>
-            <a:r>
-              <a:rPr b="0" i="0" lang="en" sz="1400" u="none" cap="none" strike="noStrike">
-                <a:solidFill>
-                  <a:srgbClr val="000000"/>
-                </a:solidFill>
-                <a:latin typeface="Arial"/>
-                <a:ea typeface="Arial"/>
-                <a:cs typeface="Arial"/>
-                <a:sym typeface="Arial"/>
-              </a:rPr>
-              <a:t>User can view the existing </a:t>
-            </a:r>
-            <a:r>
-              <a:rPr lang="en"/>
-              <a:t>weighbridge </a:t>
-            </a:r>
-            <a:r>
-              <a:rPr b="0" i="0" lang="en" sz="1400" u="none" cap="none" strike="noStrike">
-                <a:solidFill>
-                  <a:srgbClr val="000000"/>
-                </a:solidFill>
-                <a:latin typeface="Arial"/>
-                <a:ea typeface="Arial"/>
-                <a:cs typeface="Arial"/>
-                <a:sym typeface="Arial"/>
-              </a:rPr>
-              <a:t> and</a:t>
-            </a:r>
-            <a:r>
-              <a:rPr lang="en"/>
-              <a:t> </a:t>
-            </a:r>
-            <a:r>
-              <a:rPr b="0" i="0" lang="en" sz="1400" u="none" cap="none" strike="noStrike">
-                <a:solidFill>
-                  <a:srgbClr val="000000"/>
-                </a:solidFill>
-                <a:latin typeface="Arial"/>
-                <a:ea typeface="Arial"/>
-                <a:cs typeface="Arial"/>
-                <a:sym typeface="Arial"/>
-              </a:rPr>
-              <a:t>edit their attributes or delete the </a:t>
-            </a:r>
-            <a:r>
-              <a:rPr lang="en"/>
-              <a:t>weighbridge</a:t>
-            </a:r>
-            <a:r>
-              <a:rPr b="0" i="0" lang="en" sz="1400" u="none" cap="none" strike="noStrike">
-                <a:solidFill>
-                  <a:srgbClr val="000000"/>
-                </a:solidFill>
-                <a:latin typeface="Arial"/>
-                <a:ea typeface="Arial"/>
-                <a:cs typeface="Arial"/>
-                <a:sym typeface="Arial"/>
-              </a:rPr>
-              <a:t> itself. </a:t>
-            </a:r>
-            <a:endParaRPr b="0" i="0" sz="1400" u="none" cap="none" strike="noStrike">
-              <a:solidFill>
-                <a:srgbClr val="000000"/>
-              </a:solidFill>
-              <a:latin typeface="Arial"/>
-              <a:ea typeface="Arial"/>
-              <a:cs typeface="Arial"/>
-              <a:sym typeface="Arial"/>
-            </a:endParaRPr>
-          </a:p>
-        </p:txBody>
-      </p:sp>
-      <p:cxnSp>
-        <p:nvCxnSpPr>
-          <p:cNvPr id="73" name="Google Shape;73;p15"/>
-          <p:cNvCxnSpPr>
-            <a:stCxn id="72" idx="3"/>
-          </p:cNvCxnSpPr>
-          <p:nvPr/>
-        </p:nvCxnSpPr>
-        <p:spPr>
-          <a:xfrm>
-            <a:off x="2457675" y="1537750"/>
-            <a:ext cx="496800" cy="0"/>
-          </a:xfrm>
-          <a:prstGeom prst="straightConnector1">
-            <a:avLst/>
-          </a:prstGeom>
-          <a:noFill/>
-          <a:ln cap="flat" cmpd="sng" w="9525">
-            <a:solidFill>
-              <a:schemeClr val="dk2"/>
-            </a:solidFill>
-            <a:prstDash val="solid"/>
-            <a:round/>
-            <a:headEnd len="med" w="med" type="none"/>
-            <a:tailEnd len="med" w="med" type="triangle"/>
-          </a:ln>
-        </p:spPr>
-      </p:cxnSp>
-      <p:sp>
-        <p:nvSpPr>
-          <p:cNvPr id="74" name="Google Shape;74;p15"/>
-          <p:cNvSpPr/>
-          <p:nvPr/>
-        </p:nvSpPr>
-        <p:spPr>
-          <a:xfrm>
-            <a:off x="2954475" y="953650"/>
-            <a:ext cx="2618700" cy="1282500"/>
-          </a:xfrm>
-          <a:prstGeom prst="roundRect">
-            <a:avLst>
-              <a:gd fmla="val 16667" name="adj"/>
-            </a:avLst>
-          </a:prstGeom>
-          <a:solidFill>
-            <a:srgbClr val="6AA84F"/>
-          </a:solidFill>
-          <a:ln cap="flat" cmpd="sng" w="9525">
-            <a:solidFill>
-              <a:schemeClr val="dk2"/>
-            </a:solidFill>
-            <a:prstDash val="solid"/>
-            <a:round/>
-            <a:headEnd len="sm" w="sm" type="none"/>
-            <a:tailEnd len="sm" w="sm" type="none"/>
-          </a:ln>
-        </p:spPr>
-        <p:txBody>
-          <a:bodyPr anchorCtr="0" anchor="ctr" bIns="91425" lIns="91425" spcFirstLastPara="1" rIns="91425" wrap="square" tIns="91425">
-            <a:noAutofit/>
-          </a:bodyPr>
-          <a:lstStyle/>
-          <a:p>
-            <a:pPr indent="0" lvl="0" marL="0" rtl="0" algn="l">
-              <a:spcBef>
-                <a:spcPts val="0"/>
-              </a:spcBef>
-              <a:spcAft>
-                <a:spcPts val="0"/>
-              </a:spcAft>
-              <a:buNone/>
-            </a:pPr>
-            <a:r>
-              <a:rPr lang="en"/>
-              <a:t>A search box is provided for a user to search for a weighbridge.. </a:t>
-            </a:r>
-            <a:endParaRPr/>
-          </a:p>
-        </p:txBody>
-      </p:sp>
-      <p:sp>
-        <p:nvSpPr>
-          <p:cNvPr id="75" name="Google Shape;75;p15"/>
-          <p:cNvSpPr/>
-          <p:nvPr/>
-        </p:nvSpPr>
-        <p:spPr>
-          <a:xfrm>
-            <a:off x="7439900" y="762250"/>
-            <a:ext cx="1128000" cy="1665300"/>
-          </a:xfrm>
-          <a:prstGeom prst="can">
-            <a:avLst>
-              <a:gd fmla="val 25000" name="adj"/>
-            </a:avLst>
-          </a:prstGeom>
-          <a:solidFill>
-            <a:srgbClr val="A4C2F4"/>
-          </a:solidFill>
-          <a:ln cap="flat" cmpd="sng" w="9525">
-            <a:solidFill>
-              <a:schemeClr val="dk2"/>
-            </a:solidFill>
-            <a:prstDash val="solid"/>
-            <a:round/>
-            <a:headEnd len="sm" w="sm" type="none"/>
-            <a:tailEnd len="sm" w="sm" type="none"/>
-          </a:ln>
-        </p:spPr>
-        <p:txBody>
-          <a:bodyPr anchorCtr="0" anchor="ctr" bIns="91425" lIns="91425" spcFirstLastPara="1" rIns="91425" wrap="square" tIns="91425">
-            <a:noAutofit/>
-          </a:bodyPr>
-          <a:lstStyle/>
-          <a:p>
-            <a:pPr indent="0" lvl="0" marL="0" rtl="0" algn="ctr">
-              <a:spcBef>
-                <a:spcPts val="0"/>
-              </a:spcBef>
-              <a:spcAft>
-                <a:spcPts val="0"/>
-              </a:spcAft>
-              <a:buNone/>
-            </a:pPr>
-            <a:r>
-              <a:rPr lang="en"/>
-              <a:t>DB</a:t>
-            </a:r>
-            <a:endParaRPr/>
-          </a:p>
-        </p:txBody>
-      </p:sp>
-      <p:cxnSp>
-        <p:nvCxnSpPr>
-          <p:cNvPr id="76" name="Google Shape;76;p15"/>
-          <p:cNvCxnSpPr>
-            <a:stCxn id="74" idx="3"/>
-            <a:endCxn id="75" idx="2"/>
-          </p:cNvCxnSpPr>
-          <p:nvPr/>
-        </p:nvCxnSpPr>
-        <p:spPr>
-          <a:xfrm>
-            <a:off x="5573175" y="1594900"/>
-            <a:ext cx="1866600" cy="0"/>
-          </a:xfrm>
-          <a:prstGeom prst="straightConnector1">
-            <a:avLst/>
-          </a:prstGeom>
-          <a:noFill/>
-          <a:ln cap="flat" cmpd="sng" w="9525">
-            <a:solidFill>
-              <a:schemeClr val="dk2"/>
-            </a:solidFill>
-            <a:prstDash val="solid"/>
-            <a:round/>
-            <a:headEnd len="med" w="med" type="none"/>
-            <a:tailEnd len="med" w="med" type="triangle"/>
-          </a:ln>
-        </p:spPr>
-      </p:cxnSp>
-      <p:sp>
-        <p:nvSpPr>
-          <p:cNvPr id="77" name="Google Shape;77;p15"/>
-          <p:cNvSpPr/>
-          <p:nvPr/>
-        </p:nvSpPr>
-        <p:spPr>
-          <a:xfrm>
-            <a:off x="3102225" y="2954500"/>
-            <a:ext cx="2470800" cy="1544400"/>
-          </a:xfrm>
-          <a:prstGeom prst="roundRect">
-            <a:avLst>
-              <a:gd fmla="val 16667" name="adj"/>
-            </a:avLst>
-          </a:prstGeom>
-          <a:solidFill>
-            <a:srgbClr val="6AA84F"/>
-          </a:solidFill>
-          <a:ln cap="flat" cmpd="sng" w="9525">
-            <a:solidFill>
-              <a:schemeClr val="dk2"/>
-            </a:solidFill>
-            <a:prstDash val="solid"/>
-            <a:round/>
-            <a:headEnd len="sm" w="sm" type="none"/>
-            <a:tailEnd len="sm" w="sm" type="none"/>
-          </a:ln>
-        </p:spPr>
-        <p:txBody>
-          <a:bodyPr anchorCtr="0" anchor="ctr" bIns="91425" lIns="91425" spcFirstLastPara="1" rIns="91425" wrap="square" tIns="91425">
-            <a:noAutofit/>
-          </a:bodyPr>
-          <a:lstStyle/>
-          <a:p>
-            <a:pPr indent="0" lvl="0" marL="0" rtl="0" algn="l">
-              <a:spcBef>
-                <a:spcPts val="0"/>
-              </a:spcBef>
-              <a:spcAft>
-                <a:spcPts val="0"/>
-              </a:spcAft>
-              <a:buNone/>
-            </a:pPr>
-            <a:r>
-              <a:rPr lang="en"/>
-              <a:t>User needs to click under the corresponding delete symbol for the weighbridge to delete it. </a:t>
-            </a:r>
-            <a:endParaRPr/>
-          </a:p>
-        </p:txBody>
-      </p:sp>
-      <p:cxnSp>
-        <p:nvCxnSpPr>
-          <p:cNvPr id="78" name="Google Shape;78;p15"/>
-          <p:cNvCxnSpPr>
-            <a:stCxn id="72" idx="2"/>
-            <a:endCxn id="77" idx="1"/>
-          </p:cNvCxnSpPr>
-          <p:nvPr/>
-        </p:nvCxnSpPr>
-        <p:spPr>
-          <a:xfrm>
-            <a:off x="1336275" y="2236150"/>
-            <a:ext cx="1766100" cy="1490700"/>
-          </a:xfrm>
-          <a:prstGeom prst="straightConnector1">
-            <a:avLst/>
-          </a:prstGeom>
-          <a:noFill/>
-          <a:ln cap="flat" cmpd="sng" w="9525">
-            <a:solidFill>
-              <a:schemeClr val="dk2"/>
-            </a:solidFill>
-            <a:prstDash val="solid"/>
-            <a:round/>
-            <a:headEnd len="med" w="med" type="none"/>
-            <a:tailEnd len="med" w="med" type="triangle"/>
-          </a:ln>
-        </p:spPr>
-      </p:cxnSp>
-      <p:cxnSp>
-        <p:nvCxnSpPr>
-          <p:cNvPr id="79" name="Google Shape;79;p15"/>
-          <p:cNvCxnSpPr>
-            <a:stCxn id="77" idx="3"/>
-            <a:endCxn id="75" idx="2"/>
-          </p:cNvCxnSpPr>
-          <p:nvPr/>
-        </p:nvCxnSpPr>
-        <p:spPr>
-          <a:xfrm flipH="1" rot="10800000">
-            <a:off x="5573025" y="1594900"/>
-            <a:ext cx="1866900" cy="2131800"/>
-          </a:xfrm>
-          <a:prstGeom prst="straightConnector1">
-            <a:avLst/>
-          </a:prstGeom>
-          <a:noFill/>
-          <a:ln cap="flat" cmpd="sng" w="9525">
-            <a:solidFill>
-              <a:schemeClr val="dk2"/>
-            </a:solidFill>
-            <a:prstDash val="solid"/>
-            <a:round/>
-            <a:headEnd len="med" w="med" type="none"/>
-            <a:tailEnd len="med" w="med" type="triangle"/>
-          </a:ln>
-        </p:spPr>
-      </p:cxnSp>
-    </p:spTree>
-  </p:cSld>
-  <p:clrMapOvr>
-    <a:masterClrMapping/>
-  </p:clrMapOvr>
-</p:sld>
-</file>
-
-<file path=ppt/slides/slide4.xml><?xml version="1.0" encoding="utf-8"?>
-<p:sld xmlns:a="http://schemas.openxmlformats.org/drawingml/2006/main" xmlns:r="http://schemas.openxmlformats.org/officeDocument/2006/relationships" xmlns:mc="http://schemas.openxmlformats.org/markup-compatibility/2006" xmlns:mv="urn:schemas-microsoft-com:mac:vml" xmlns:p="http://schemas.openxmlformats.org/presentationml/2006/main" xmlns:c="http://schemas.openxmlformats.org/drawingml/2006/chart" xmlns:dgm="http://schemas.openxmlformats.org/drawingml/2006/diagram" xmlns:o="urn:schemas-microsoft-com:office:office" xmlns:v="urn:schemas-microsoft-com:vml" xmlns:pvml="urn:schemas-microsoft-com:office:powerpoint" xmlns:com="http://schemas.openxmlformats.org/drawingml/2006/compatibility" xmlns:p14="http://schemas.microsoft.com/office/powerpoint/2010/main" xmlns:p15="http://schemas.microsoft.com/office/powerpoint/2012/main" xmlns:ahyp="http://schemas.microsoft.com/office/drawing/2018/hyperlinkcolor">
-  <p:cSld>
-    <p:spTree>
-      <p:nvGrpSpPr>
-        <p:cNvPr id="83" name="Shape 83"/>
-        <p:cNvGrpSpPr/>
-        <p:nvPr/>
-      </p:nvGrpSpPr>
-      <p:grpSpPr>
-        <a:xfrm>
-          <a:off x="0" y="0"/>
-          <a:ext cx="0" cy="0"/>
-          <a:chOff x="0" y="0"/>
-          <a:chExt cx="0" cy="0"/>
-        </a:xfrm>
-      </p:grpSpPr>
-      <p:sp>
-        <p:nvSpPr>
-          <p:cNvPr id="84" name="Google Shape;84;p16"/>
-          <p:cNvSpPr txBox="1"/>
-          <p:nvPr/>
-        </p:nvSpPr>
-        <p:spPr>
-          <a:xfrm>
-            <a:off x="362600" y="53750"/>
-            <a:ext cx="1974300" cy="671400"/>
-          </a:xfrm>
-          <a:prstGeom prst="rect">
-            <a:avLst/>
-          </a:prstGeom>
-          <a:noFill/>
-          <a:ln>
-            <a:noFill/>
-          </a:ln>
-        </p:spPr>
-        <p:txBody>
-          <a:bodyPr anchorCtr="0" anchor="t" bIns="91425" lIns="91425" spcFirstLastPara="1" rIns="91425" wrap="square" tIns="91425">
-            <a:noAutofit/>
-          </a:bodyPr>
-          <a:lstStyle/>
-          <a:p>
-            <a:pPr indent="0" lvl="0" marL="0" marR="0" rtl="0" algn="l">
-              <a:lnSpc>
-                <a:spcPct val="100000"/>
-              </a:lnSpc>
-              <a:spcBef>
-                <a:spcPts val="0"/>
-              </a:spcBef>
-              <a:spcAft>
-                <a:spcPts val="0"/>
-              </a:spcAft>
-              <a:buClr>
-                <a:srgbClr val="000000"/>
-              </a:buClr>
-              <a:buSzPts val="1400"/>
-              <a:buFont typeface="Arial"/>
-              <a:buNone/>
-            </a:pPr>
-            <a:r>
-              <a:rPr b="0" i="0" lang="en" sz="1400" u="none" cap="none" strike="noStrike">
-                <a:solidFill>
-                  <a:srgbClr val="000000"/>
-                </a:solidFill>
-                <a:latin typeface="Arial"/>
-                <a:ea typeface="Arial"/>
-                <a:cs typeface="Arial"/>
-                <a:sym typeface="Arial"/>
-              </a:rPr>
-              <a:t>Re-allocate by vehicle</a:t>
-            </a:r>
-            <a:endParaRPr b="0" i="0" sz="1400" u="none" cap="none" strike="noStrike">
-              <a:solidFill>
-                <a:srgbClr val="000000"/>
-              </a:solidFill>
-              <a:latin typeface="Arial"/>
-              <a:ea typeface="Arial"/>
-              <a:cs typeface="Arial"/>
-              <a:sym typeface="Arial"/>
-            </a:endParaRPr>
-          </a:p>
-        </p:txBody>
-      </p:sp>
-      <p:sp>
-        <p:nvSpPr>
-          <p:cNvPr id="85" name="Google Shape;85;p16"/>
-          <p:cNvSpPr/>
-          <p:nvPr/>
-        </p:nvSpPr>
-        <p:spPr>
-          <a:xfrm>
-            <a:off x="691575" y="725150"/>
-            <a:ext cx="2867100" cy="1839900"/>
-          </a:xfrm>
-          <a:prstGeom prst="roundRect">
-            <a:avLst>
-              <a:gd fmla="val 16667" name="adj"/>
-            </a:avLst>
-          </a:prstGeom>
-          <a:solidFill>
-            <a:srgbClr val="6AA84F"/>
-          </a:solidFill>
-          <a:ln cap="flat" cmpd="sng" w="9525">
-            <a:solidFill>
-              <a:schemeClr val="dk2"/>
-            </a:solidFill>
-            <a:prstDash val="solid"/>
-            <a:round/>
-            <a:headEnd len="sm" w="sm" type="none"/>
-            <a:tailEnd len="sm" w="sm" type="none"/>
-          </a:ln>
-        </p:spPr>
-        <p:txBody>
-          <a:bodyPr anchorCtr="0" anchor="ctr" bIns="91425" lIns="91425" spcFirstLastPara="1" rIns="91425" wrap="square" tIns="91425">
-            <a:noAutofit/>
-          </a:bodyPr>
-          <a:lstStyle/>
-          <a:p>
-            <a:pPr indent="0" lvl="0" marL="0" marR="0" rtl="0" algn="l">
-              <a:lnSpc>
-                <a:spcPct val="100000"/>
-              </a:lnSpc>
-              <a:spcBef>
-                <a:spcPts val="0"/>
-              </a:spcBef>
-              <a:spcAft>
-                <a:spcPts val="0"/>
-              </a:spcAft>
-              <a:buClr>
-                <a:srgbClr val="000000"/>
-              </a:buClr>
-              <a:buSzPts val="1400"/>
-              <a:buFont typeface="Arial"/>
-              <a:buNone/>
-            </a:pPr>
-            <a:r>
-              <a:rPr b="0" i="0" lang="en" sz="1400" u="none" cap="none" strike="noStrike">
-                <a:solidFill>
-                  <a:srgbClr val="000000"/>
-                </a:solidFill>
-                <a:latin typeface="Arial"/>
-                <a:ea typeface="Arial"/>
-                <a:cs typeface="Arial"/>
-                <a:sym typeface="Arial"/>
-              </a:rPr>
-              <a:t>The user can view the list of active external vehicles which are yet to be </a:t>
-            </a:r>
-            <a:r>
-              <a:rPr lang="en"/>
-              <a:t>weighed</a:t>
-            </a:r>
-            <a:r>
-              <a:rPr b="0" i="0" lang="en" sz="1400" u="none" cap="none" strike="noStrike">
-                <a:solidFill>
-                  <a:srgbClr val="000000"/>
-                </a:solidFill>
-                <a:latin typeface="Arial"/>
-                <a:ea typeface="Arial"/>
-                <a:cs typeface="Arial"/>
-                <a:sym typeface="Arial"/>
-              </a:rPr>
-              <a:t> in the plant in the “reallocate by vehicle” tab and reallocate </a:t>
-            </a:r>
-            <a:r>
-              <a:rPr lang="en"/>
-              <a:t>weighbridge</a:t>
-            </a:r>
-            <a:r>
-              <a:rPr b="0" i="0" lang="en" sz="1400" u="none" cap="none" strike="noStrike">
-                <a:solidFill>
-                  <a:srgbClr val="000000"/>
-                </a:solidFill>
-                <a:latin typeface="Arial"/>
-                <a:ea typeface="Arial"/>
-                <a:cs typeface="Arial"/>
-                <a:sym typeface="Arial"/>
-              </a:rPr>
-              <a:t> to them if they wish to do so. This will be persisted in the DB.</a:t>
-            </a:r>
-            <a:endParaRPr b="0" i="0" sz="1400" u="none" cap="none" strike="noStrike">
-              <a:solidFill>
-                <a:srgbClr val="000000"/>
-              </a:solidFill>
-              <a:latin typeface="Arial"/>
-              <a:ea typeface="Arial"/>
-              <a:cs typeface="Arial"/>
-              <a:sym typeface="Arial"/>
-            </a:endParaRPr>
-          </a:p>
-        </p:txBody>
-      </p:sp>
-      <p:sp>
-        <p:nvSpPr>
-          <p:cNvPr id="86" name="Google Shape;86;p16"/>
-          <p:cNvSpPr/>
-          <p:nvPr/>
-        </p:nvSpPr>
-        <p:spPr>
-          <a:xfrm>
-            <a:off x="5506425" y="537050"/>
-            <a:ext cx="1692000" cy="2028000"/>
-          </a:xfrm>
-          <a:prstGeom prst="can">
-            <a:avLst>
-              <a:gd fmla="val 25000" name="adj"/>
-            </a:avLst>
-          </a:prstGeom>
-          <a:solidFill>
-            <a:srgbClr val="A4C2F4"/>
-          </a:solidFill>
-          <a:ln cap="flat" cmpd="sng" w="9525">
-            <a:solidFill>
-              <a:schemeClr val="dk2"/>
-            </a:solidFill>
-            <a:prstDash val="solid"/>
-            <a:round/>
-            <a:headEnd len="sm" w="sm" type="none"/>
-            <a:tailEnd len="sm" w="sm" type="none"/>
-          </a:ln>
-        </p:spPr>
-        <p:txBody>
-          <a:bodyPr anchorCtr="0" anchor="ctr" bIns="91425" lIns="91425" spcFirstLastPara="1" rIns="91425" wrap="square" tIns="91425">
-            <a:noAutofit/>
-          </a:bodyPr>
-          <a:lstStyle/>
-          <a:p>
-            <a:pPr indent="0" lvl="0" marL="0" marR="0" rtl="0" algn="ctr">
-              <a:lnSpc>
-                <a:spcPct val="100000"/>
-              </a:lnSpc>
-              <a:spcBef>
-                <a:spcPts val="0"/>
-              </a:spcBef>
-              <a:spcAft>
-                <a:spcPts val="0"/>
-              </a:spcAft>
-              <a:buClr>
-                <a:srgbClr val="000000"/>
-              </a:buClr>
-              <a:buSzPts val="1400"/>
-              <a:buFont typeface="Arial"/>
-              <a:buNone/>
-            </a:pPr>
-            <a:r>
-              <a:rPr lang="en"/>
-              <a:t>DB</a:t>
-            </a:r>
-            <a:endParaRPr b="0" i="0" sz="1400" u="none" cap="none" strike="noStrike">
-              <a:solidFill>
-                <a:srgbClr val="000000"/>
-              </a:solidFill>
-              <a:latin typeface="Arial"/>
-              <a:ea typeface="Arial"/>
-              <a:cs typeface="Arial"/>
-              <a:sym typeface="Arial"/>
-            </a:endParaRPr>
-          </a:p>
-        </p:txBody>
-      </p:sp>
-      <p:cxnSp>
-        <p:nvCxnSpPr>
-          <p:cNvPr id="87" name="Google Shape;87;p16"/>
-          <p:cNvCxnSpPr>
-            <a:stCxn id="88" idx="0"/>
-            <a:endCxn id="86" idx="2"/>
-          </p:cNvCxnSpPr>
-          <p:nvPr/>
-        </p:nvCxnSpPr>
-        <p:spPr>
-          <a:xfrm flipH="1" rot="10800000">
-            <a:off x="4366125" y="1551200"/>
-            <a:ext cx="1140300" cy="1497300"/>
-          </a:xfrm>
-          <a:prstGeom prst="straightConnector1">
-            <a:avLst/>
-          </a:prstGeom>
-          <a:noFill/>
-          <a:ln cap="flat" cmpd="sng" w="9525">
-            <a:solidFill>
-              <a:schemeClr val="dk2"/>
-            </a:solidFill>
-            <a:prstDash val="solid"/>
-            <a:round/>
-            <a:headEnd len="sm" w="sm" type="none"/>
-            <a:tailEnd len="med" w="med" type="triangle"/>
-          </a:ln>
-        </p:spPr>
-      </p:cxnSp>
-      <p:sp>
-        <p:nvSpPr>
-          <p:cNvPr id="88" name="Google Shape;88;p16"/>
-          <p:cNvSpPr/>
-          <p:nvPr/>
-        </p:nvSpPr>
-        <p:spPr>
-          <a:xfrm>
-            <a:off x="2125125" y="3048500"/>
-            <a:ext cx="4482000" cy="1960800"/>
-          </a:xfrm>
-          <a:prstGeom prst="roundRect">
-            <a:avLst>
-              <a:gd fmla="val 16667" name="adj"/>
-            </a:avLst>
-          </a:prstGeom>
-          <a:solidFill>
-            <a:srgbClr val="6AA84F"/>
-          </a:solidFill>
-          <a:ln cap="flat" cmpd="sng" w="9525">
-            <a:solidFill>
-              <a:schemeClr val="dk2"/>
-            </a:solidFill>
-            <a:prstDash val="solid"/>
-            <a:round/>
-            <a:headEnd len="sm" w="sm" type="none"/>
-            <a:tailEnd len="sm" w="sm" type="none"/>
-          </a:ln>
-        </p:spPr>
-        <p:txBody>
-          <a:bodyPr anchorCtr="0" anchor="ctr" bIns="91425" lIns="91425" spcFirstLastPara="1" rIns="91425" wrap="square" tIns="91425">
-            <a:noAutofit/>
-          </a:bodyPr>
-          <a:lstStyle/>
-          <a:p>
-            <a:pPr indent="0" lvl="0" marL="0" rtl="0" algn="l">
-              <a:spcBef>
-                <a:spcPts val="0"/>
-              </a:spcBef>
-              <a:spcAft>
-                <a:spcPts val="0"/>
-              </a:spcAft>
-              <a:buClr>
-                <a:schemeClr val="dk1"/>
-              </a:buClr>
-              <a:buSzPts val="1100"/>
-              <a:buFont typeface="Arial"/>
-              <a:buNone/>
-            </a:pPr>
-            <a:r>
-              <a:rPr lang="en">
-                <a:solidFill>
-                  <a:schemeClr val="dk1"/>
-                </a:solidFill>
-              </a:rPr>
-              <a:t>The user can reallocate a new weighbridge  by selecting the checkbox against the specific vehicle and then select the corresponding drop down under the “reallocate” column and then submit</a:t>
-            </a:r>
-            <a:endParaRPr/>
-          </a:p>
-        </p:txBody>
-      </p:sp>
-      <p:cxnSp>
-        <p:nvCxnSpPr>
-          <p:cNvPr id="89" name="Google Shape;89;p16"/>
-          <p:cNvCxnSpPr>
-            <a:stCxn id="85" idx="2"/>
-            <a:endCxn id="88" idx="0"/>
-          </p:cNvCxnSpPr>
-          <p:nvPr/>
-        </p:nvCxnSpPr>
-        <p:spPr>
-          <a:xfrm>
-            <a:off x="2125125" y="2565050"/>
-            <a:ext cx="2241000" cy="483600"/>
-          </a:xfrm>
-          <a:prstGeom prst="straightConnector1">
-            <a:avLst/>
-          </a:prstGeom>
-          <a:noFill/>
-          <a:ln cap="flat" cmpd="sng" w="9525">
-            <a:solidFill>
-              <a:schemeClr val="dk2"/>
-            </a:solidFill>
-            <a:prstDash val="solid"/>
-            <a:round/>
-            <a:headEnd len="med" w="med" type="none"/>
-            <a:tailEnd len="med" w="med" type="triangle"/>
-          </a:ln>
-        </p:spPr>
-      </p:cxnSp>
-    </p:spTree>
-  </p:cSld>
-  <p:clrMapOvr>
-    <a:masterClrMapping/>
-  </p:clrMapOvr>
-</p:sld>
-</file>
-
-<file path=ppt/slides/slide5.xml><?xml version="1.0" encoding="utf-8"?>
-<p:sld xmlns:a="http://schemas.openxmlformats.org/drawingml/2006/main" xmlns:r="http://schemas.openxmlformats.org/officeDocument/2006/relationships" xmlns:mc="http://schemas.openxmlformats.org/markup-compatibility/2006" xmlns:mv="urn:schemas-microsoft-com:mac:vml" xmlns:p="http://schemas.openxmlformats.org/presentationml/2006/main" xmlns:c="http://schemas.openxmlformats.org/drawingml/2006/chart" xmlns:dgm="http://schemas.openxmlformats.org/drawingml/2006/diagram" xmlns:o="urn:schemas-microsoft-com:office:office" xmlns:v="urn:schemas-microsoft-com:vml" xmlns:pvml="urn:schemas-microsoft-com:office:powerpoint" xmlns:com="http://schemas.openxmlformats.org/drawingml/2006/compatibility" xmlns:p14="http://schemas.microsoft.com/office/powerpoint/2010/main" xmlns:p15="http://schemas.microsoft.com/office/powerpoint/2012/main" xmlns:ahyp="http://schemas.microsoft.com/office/drawing/2018/hyperlinkcolor">
-  <p:cSld>
-    <p:spTree>
-      <p:nvGrpSpPr>
-        <p:cNvPr id="93" name="Shape 93"/>
-        <p:cNvGrpSpPr/>
-        <p:nvPr/>
-      </p:nvGrpSpPr>
-      <p:grpSpPr>
-        <a:xfrm>
-          <a:off x="0" y="0"/>
-          <a:ext cx="0" cy="0"/>
-          <a:chOff x="0" y="0"/>
-          <a:chExt cx="0" cy="0"/>
-        </a:xfrm>
-      </p:grpSpPr>
-      <p:sp>
-        <p:nvSpPr>
-          <p:cNvPr id="94" name="Google Shape;94;p17"/>
+          <p:cNvPr id="86" name="Google Shape;86;p15"/>
           <p:cNvSpPr/>
           <p:nvPr/>
         </p:nvSpPr>
@@ -10441,26 +9978,50 @@
           </a:bodyPr>
           <a:lstStyle/>
           <a:p>
-            <a:pPr indent="0" lvl="0" marL="0" rtl="0" algn="l">
-              <a:spcBef>
-                <a:spcPts val="0"/>
-              </a:spcBef>
-              <a:spcAft>
-                <a:spcPts val="0"/>
-              </a:spcAft>
+            <a:pPr indent="0" lvl="0" marL="0" marR="0" rtl="0" algn="l">
+              <a:lnSpc>
+                <a:spcPct val="100000"/>
+              </a:lnSpc>
+              <a:spcBef>
+                <a:spcPts val="0"/>
+              </a:spcBef>
+              <a:spcAft>
+                <a:spcPts val="0"/>
+              </a:spcAft>
+              <a:buClr>
+                <a:srgbClr val="000000"/>
+              </a:buClr>
+              <a:buSzPts val="1400"/>
+              <a:buFont typeface="Arial"/>
               <a:buNone/>
             </a:pPr>
             <a:r>
-              <a:rPr lang="en"/>
+              <a:rPr b="0" i="0" lang="en" sz="1400" u="none" cap="none" strike="noStrike">
+                <a:solidFill>
+                  <a:srgbClr val="000000"/>
+                </a:solidFill>
+                <a:latin typeface="Arial"/>
+                <a:ea typeface="Arial"/>
+                <a:cs typeface="Arial"/>
+                <a:sym typeface="Arial"/>
+              </a:rPr>
               <a:t>Duing mine-dispatch weighbridge allocation takes place. </a:t>
             </a:r>
-            <a:endParaRPr/>
+            <a:endParaRPr b="0" i="0" sz="1400" u="none" cap="none" strike="noStrike">
+              <a:solidFill>
+                <a:srgbClr val="000000"/>
+              </a:solidFill>
+              <a:latin typeface="Arial"/>
+              <a:ea typeface="Arial"/>
+              <a:cs typeface="Arial"/>
+              <a:sym typeface="Arial"/>
+            </a:endParaRPr>
           </a:p>
         </p:txBody>
       </p:sp>
       <p:sp>
         <p:nvSpPr>
-          <p:cNvPr id="95" name="Google Shape;95;p17"/>
+          <p:cNvPr id="87" name="Google Shape;87;p15"/>
           <p:cNvSpPr txBox="1"/>
           <p:nvPr/>
         </p:nvSpPr>
@@ -10483,6 +10044,111 @@
           </a:bodyPr>
           <a:lstStyle/>
           <a:p>
+            <a:pPr indent="0" lvl="0" marL="0" marR="0" rtl="0" algn="l">
+              <a:lnSpc>
+                <a:spcPct val="100000"/>
+              </a:lnSpc>
+              <a:spcBef>
+                <a:spcPts val="0"/>
+              </a:spcBef>
+              <a:spcAft>
+                <a:spcPts val="0"/>
+              </a:spcAft>
+              <a:buClr>
+                <a:srgbClr val="000000"/>
+              </a:buClr>
+              <a:buSzPts val="1400"/>
+              <a:buFont typeface="Arial"/>
+              <a:buNone/>
+            </a:pPr>
+            <a:r>
+              <a:rPr b="0" i="0" lang="en" sz="1400" u="none" cap="none" strike="noStrike">
+                <a:solidFill>
+                  <a:srgbClr val="000000"/>
+                </a:solidFill>
+                <a:latin typeface="Arial"/>
+                <a:ea typeface="Arial"/>
+                <a:cs typeface="Arial"/>
+                <a:sym typeface="Arial"/>
+              </a:rPr>
+              <a:t>Weighbridge allocation and reallocation</a:t>
+            </a:r>
+            <a:endParaRPr b="0" i="0" sz="1400" u="none" cap="none" strike="noStrike">
+              <a:solidFill>
+                <a:srgbClr val="000000"/>
+              </a:solidFill>
+              <a:latin typeface="Arial"/>
+              <a:ea typeface="Arial"/>
+              <a:cs typeface="Arial"/>
+              <a:sym typeface="Arial"/>
+            </a:endParaRPr>
+          </a:p>
+        </p:txBody>
+      </p:sp>
+      <p:cxnSp>
+        <p:nvCxnSpPr>
+          <p:cNvPr id="88" name="Google Shape;88;p15"/>
+          <p:cNvCxnSpPr>
+            <a:stCxn id="86" idx="3"/>
+            <a:endCxn id="89" idx="1"/>
+          </p:cNvCxnSpPr>
+          <p:nvPr/>
+        </p:nvCxnSpPr>
+        <p:spPr>
+          <a:xfrm flipH="1" rot="10800000">
+            <a:off x="2981275" y="1007625"/>
+            <a:ext cx="907500" cy="449400"/>
+          </a:xfrm>
+          <a:prstGeom prst="straightConnector1">
+            <a:avLst/>
+          </a:prstGeom>
+          <a:noFill/>
+          <a:ln cap="flat" cmpd="sng" w="9525">
+            <a:solidFill>
+              <a:schemeClr val="dk2"/>
+            </a:solidFill>
+            <a:prstDash val="solid"/>
+            <a:round/>
+            <a:headEnd len="sm" w="sm" type="none"/>
+            <a:tailEnd len="med" w="med" type="triangle"/>
+          </a:ln>
+        </p:spPr>
+      </p:cxnSp>
+      <p:sp>
+        <p:nvSpPr>
+          <p:cNvPr id="89" name="Google Shape;89;p15"/>
+          <p:cNvSpPr/>
+          <p:nvPr/>
+        </p:nvSpPr>
+        <p:spPr>
+          <a:xfrm>
+            <a:off x="3888788" y="344850"/>
+            <a:ext cx="2256300" cy="1325400"/>
+          </a:xfrm>
+          <a:prstGeom prst="roundRect">
+            <a:avLst>
+              <a:gd fmla="val 16667" name="adj"/>
+            </a:avLst>
+          </a:prstGeom>
+          <a:solidFill>
+            <a:srgbClr val="6D9EEB"/>
+          </a:solidFill>
+          <a:ln cap="flat" cmpd="sng" w="9525">
+            <a:solidFill>
+              <a:schemeClr val="dk2"/>
+            </a:solidFill>
+            <a:prstDash val="solid"/>
+            <a:round/>
+            <a:headEnd len="sm" w="sm" type="none"/>
+            <a:tailEnd len="sm" w="sm" type="none"/>
+          </a:ln>
+        </p:spPr>
+        <p:txBody>
+          <a:bodyPr anchorCtr="0" anchor="ctr" bIns="91425" lIns="91425" spcFirstLastPara="1" rIns="91425" wrap="square" tIns="91425">
+            <a:noAutofit/>
+          </a:bodyPr>
+          <a:lstStyle/>
+          <a:p>
             <a:pPr indent="0" lvl="0" marL="0" rtl="0" algn="l">
               <a:spcBef>
                 <a:spcPts val="0"/>
@@ -10494,7 +10160,7 @@
             </a:pPr>
             <a:r>
               <a:rPr lang="en"/>
-              <a:t>Weighbridge allocation</a:t>
+              <a:t>The weighbridge is allocated based on proximity to vehicle, queue length,vehicle type(number of wheels) and capacity.</a:t>
             </a:r>
             <a:endParaRPr/>
           </a:p>
@@ -10502,14 +10168,174 @@
       </p:sp>
       <p:sp>
         <p:nvSpPr>
-          <p:cNvPr id="96" name="Google Shape;96;p17"/>
+          <p:cNvPr id="90" name="Google Shape;90;p15"/>
           <p:cNvSpPr/>
           <p:nvPr/>
         </p:nvSpPr>
         <p:spPr>
           <a:xfrm>
-            <a:off x="3827400" y="725200"/>
-            <a:ext cx="2551500" cy="1584600"/>
+            <a:off x="3343374" y="2129975"/>
+            <a:ext cx="2672400" cy="1199100"/>
+          </a:xfrm>
+          <a:prstGeom prst="flowChartDecision">
+            <a:avLst/>
+          </a:prstGeom>
+          <a:solidFill>
+            <a:srgbClr val="6D9EEB"/>
+          </a:solidFill>
+          <a:ln cap="flat" cmpd="sng" w="9525">
+            <a:solidFill>
+              <a:schemeClr val="dk2"/>
+            </a:solidFill>
+            <a:prstDash val="solid"/>
+            <a:round/>
+            <a:headEnd len="sm" w="sm" type="none"/>
+            <a:tailEnd len="sm" w="sm" type="none"/>
+          </a:ln>
+        </p:spPr>
+        <p:txBody>
+          <a:bodyPr anchorCtr="0" anchor="ctr" bIns="91425" lIns="91425" spcFirstLastPara="1" rIns="91425" wrap="square" tIns="91425">
+            <a:noAutofit/>
+          </a:bodyPr>
+          <a:lstStyle/>
+          <a:p>
+            <a:pPr indent="0" lvl="0" marL="0" rtl="0" algn="l">
+              <a:spcBef>
+                <a:spcPts val="0"/>
+              </a:spcBef>
+              <a:spcAft>
+                <a:spcPts val="0"/>
+              </a:spcAft>
+              <a:buNone/>
+            </a:pPr>
+            <a:r>
+              <a:rPr lang="en"/>
+              <a:t>Weighbridge allocated?</a:t>
+            </a:r>
+            <a:endParaRPr/>
+          </a:p>
+        </p:txBody>
+      </p:sp>
+      <p:sp>
+        <p:nvSpPr>
+          <p:cNvPr id="91" name="Google Shape;91;p15"/>
+          <p:cNvSpPr/>
+          <p:nvPr/>
+        </p:nvSpPr>
+        <p:spPr>
+          <a:xfrm>
+            <a:off x="7510150" y="2003750"/>
+            <a:ext cx="1262100" cy="1688100"/>
+          </a:xfrm>
+          <a:prstGeom prst="can">
+            <a:avLst>
+              <a:gd fmla="val 25000" name="adj"/>
+            </a:avLst>
+          </a:prstGeom>
+          <a:solidFill>
+            <a:srgbClr val="6D9EEB"/>
+          </a:solidFill>
+          <a:ln cap="flat" cmpd="sng" w="9525">
+            <a:solidFill>
+              <a:schemeClr val="dk2"/>
+            </a:solidFill>
+            <a:prstDash val="solid"/>
+            <a:round/>
+            <a:headEnd len="sm" w="sm" type="none"/>
+            <a:tailEnd len="sm" w="sm" type="none"/>
+          </a:ln>
+        </p:spPr>
+        <p:txBody>
+          <a:bodyPr anchorCtr="0" anchor="ctr" bIns="91425" lIns="91425" spcFirstLastPara="1" rIns="91425" wrap="square" tIns="91425">
+            <a:noAutofit/>
+          </a:bodyPr>
+          <a:lstStyle/>
+          <a:p>
+            <a:pPr indent="0" lvl="0" marL="0" rtl="0" algn="ctr">
+              <a:spcBef>
+                <a:spcPts val="0"/>
+              </a:spcBef>
+              <a:spcAft>
+                <a:spcPts val="0"/>
+              </a:spcAft>
+              <a:buNone/>
+            </a:pPr>
+            <a:r>
+              <a:rPr lang="en"/>
+              <a:t>DB</a:t>
+            </a:r>
+            <a:endParaRPr/>
+          </a:p>
+        </p:txBody>
+      </p:sp>
+      <p:cxnSp>
+        <p:nvCxnSpPr>
+          <p:cNvPr id="92" name="Google Shape;92;p15"/>
+          <p:cNvCxnSpPr>
+            <a:stCxn id="90" idx="3"/>
+            <a:endCxn id="91" idx="2"/>
+          </p:cNvCxnSpPr>
+          <p:nvPr/>
+        </p:nvCxnSpPr>
+        <p:spPr>
+          <a:xfrm>
+            <a:off x="6015774" y="2729525"/>
+            <a:ext cx="1494300" cy="118200"/>
+          </a:xfrm>
+          <a:prstGeom prst="straightConnector1">
+            <a:avLst/>
+          </a:prstGeom>
+          <a:noFill/>
+          <a:ln cap="flat" cmpd="sng" w="9525">
+            <a:solidFill>
+              <a:schemeClr val="dk2"/>
+            </a:solidFill>
+            <a:prstDash val="solid"/>
+            <a:round/>
+            <a:headEnd len="med" w="med" type="none"/>
+            <a:tailEnd len="med" w="med" type="triangle"/>
+          </a:ln>
+        </p:spPr>
+      </p:cxnSp>
+      <p:cxnSp>
+        <p:nvCxnSpPr>
+          <p:cNvPr id="93" name="Google Shape;93;p15"/>
+          <p:cNvCxnSpPr>
+            <a:stCxn id="89" idx="2"/>
+            <a:endCxn id="90" idx="0"/>
+          </p:cNvCxnSpPr>
+          <p:nvPr/>
+        </p:nvCxnSpPr>
+        <p:spPr>
+          <a:xfrm flipH="1">
+            <a:off x="4679438" y="1670250"/>
+            <a:ext cx="337500" cy="459600"/>
+          </a:xfrm>
+          <a:prstGeom prst="straightConnector1">
+            <a:avLst/>
+          </a:prstGeom>
+          <a:noFill/>
+          <a:ln cap="flat" cmpd="sng" w="9525">
+            <a:solidFill>
+              <a:schemeClr val="dk2"/>
+            </a:solidFill>
+            <a:prstDash val="solid"/>
+            <a:round/>
+            <a:headEnd len="med" w="med" type="none"/>
+            <a:tailEnd len="med" w="med" type="triangle"/>
+          </a:ln>
+        </p:spPr>
+      </p:cxnSp>
+      <p:sp>
+        <p:nvSpPr>
+          <p:cNvPr id="94" name="Google Shape;94;p15"/>
+          <p:cNvSpPr/>
+          <p:nvPr/>
+        </p:nvSpPr>
+        <p:spPr>
+          <a:xfrm>
+            <a:off x="0" y="2934625"/>
+            <a:ext cx="2256300" cy="1199100"/>
           </a:xfrm>
           <a:prstGeom prst="roundRect">
             <a:avLst>
@@ -10546,7 +10372,7 @@
             </a:pPr>
             <a:r>
               <a:rPr lang="en"/>
-              <a:t> Internally the weighbridge in the proximity of that specific entry point and with a queue length less than its maximum is allocated.</a:t>
+              <a:t>User can go to reallocate by vehicle tab in weighbridge management and select a vehicle and reallocate a weighbridge </a:t>
             </a:r>
             <a:endParaRPr/>
           </a:p>
@@ -10554,14 +10380,208 @@
       </p:sp>
       <p:sp>
         <p:nvSpPr>
-          <p:cNvPr id="97" name="Google Shape;97;p17"/>
+          <p:cNvPr id="95" name="Google Shape;95;p15"/>
           <p:cNvSpPr/>
           <p:nvPr/>
         </p:nvSpPr>
         <p:spPr>
           <a:xfrm>
-            <a:off x="3800550" y="3008200"/>
-            <a:ext cx="2672400" cy="1463700"/>
+            <a:off x="5016950" y="3788800"/>
+            <a:ext cx="2256300" cy="1199100"/>
+          </a:xfrm>
+          <a:prstGeom prst="roundRect">
+            <a:avLst>
+              <a:gd fmla="val 16667" name="adj"/>
+            </a:avLst>
+          </a:prstGeom>
+          <a:solidFill>
+            <a:srgbClr val="6D9EEB"/>
+          </a:solidFill>
+          <a:ln cap="flat" cmpd="sng" w="9525">
+            <a:solidFill>
+              <a:schemeClr val="dk2"/>
+            </a:solidFill>
+            <a:prstDash val="solid"/>
+            <a:round/>
+            <a:headEnd len="sm" w="sm" type="none"/>
+            <a:tailEnd len="sm" w="sm" type="none"/>
+          </a:ln>
+        </p:spPr>
+        <p:txBody>
+          <a:bodyPr anchorCtr="0" anchor="ctr" bIns="91425" lIns="91425" spcFirstLastPara="1" rIns="91425" wrap="square" tIns="91425">
+            <a:noAutofit/>
+          </a:bodyPr>
+          <a:lstStyle/>
+          <a:p>
+            <a:pPr indent="0" lvl="0" marL="0" rtl="0" algn="l">
+              <a:spcBef>
+                <a:spcPts val="0"/>
+              </a:spcBef>
+              <a:spcAft>
+                <a:spcPts val="0"/>
+              </a:spcAft>
+              <a:buNone/>
+            </a:pPr>
+            <a:r>
+              <a:rPr lang="en"/>
+              <a:t>Weighbridge is reallocated if the vehicle type, capacity matches and the queue length is less than the threshold</a:t>
+            </a:r>
+            <a:endParaRPr/>
+          </a:p>
+        </p:txBody>
+      </p:sp>
+      <p:cxnSp>
+        <p:nvCxnSpPr>
+          <p:cNvPr id="96" name="Google Shape;96;p15"/>
+          <p:cNvCxnSpPr>
+            <a:stCxn id="95" idx="3"/>
+            <a:endCxn id="91" idx="2"/>
+          </p:cNvCxnSpPr>
+          <p:nvPr/>
+        </p:nvCxnSpPr>
+        <p:spPr>
+          <a:xfrm flipH="1" rot="10800000">
+            <a:off x="7273250" y="2847850"/>
+            <a:ext cx="237000" cy="1540500"/>
+          </a:xfrm>
+          <a:prstGeom prst="straightConnector1">
+            <a:avLst/>
+          </a:prstGeom>
+          <a:noFill/>
+          <a:ln cap="flat" cmpd="sng" w="9525">
+            <a:solidFill>
+              <a:schemeClr val="dk2"/>
+            </a:solidFill>
+            <a:prstDash val="solid"/>
+            <a:round/>
+            <a:headEnd len="med" w="med" type="none"/>
+            <a:tailEnd len="med" w="med" type="triangle"/>
+          </a:ln>
+        </p:spPr>
+      </p:cxnSp>
+      <p:cxnSp>
+        <p:nvCxnSpPr>
+          <p:cNvPr id="97" name="Google Shape;97;p15"/>
+          <p:cNvCxnSpPr>
+            <a:stCxn id="90" idx="1"/>
+            <a:endCxn id="94" idx="0"/>
+          </p:cNvCxnSpPr>
+          <p:nvPr/>
+        </p:nvCxnSpPr>
+        <p:spPr>
+          <a:xfrm flipH="1">
+            <a:off x="1128174" y="2729525"/>
+            <a:ext cx="2215200" cy="205200"/>
+          </a:xfrm>
+          <a:prstGeom prst="straightConnector1">
+            <a:avLst/>
+          </a:prstGeom>
+          <a:noFill/>
+          <a:ln cap="flat" cmpd="sng" w="9525">
+            <a:solidFill>
+              <a:schemeClr val="dk2"/>
+            </a:solidFill>
+            <a:prstDash val="solid"/>
+            <a:round/>
+            <a:headEnd len="med" w="med" type="none"/>
+            <a:tailEnd len="med" w="med" type="triangle"/>
+          </a:ln>
+        </p:spPr>
+      </p:cxnSp>
+      <p:sp>
+        <p:nvSpPr>
+          <p:cNvPr id="98" name="Google Shape;98;p15"/>
+          <p:cNvSpPr txBox="1"/>
+          <p:nvPr/>
+        </p:nvSpPr>
+        <p:spPr>
+          <a:xfrm>
+            <a:off x="2256300" y="2406150"/>
+            <a:ext cx="567900" cy="331200"/>
+          </a:xfrm>
+          <a:prstGeom prst="rect">
+            <a:avLst/>
+          </a:prstGeom>
+          <a:noFill/>
+          <a:ln>
+            <a:noFill/>
+          </a:ln>
+        </p:spPr>
+        <p:txBody>
+          <a:bodyPr anchorCtr="0" anchor="t" bIns="91425" lIns="91425" spcFirstLastPara="1" rIns="91425" wrap="square" tIns="91425">
+            <a:noAutofit/>
+          </a:bodyPr>
+          <a:lstStyle/>
+          <a:p>
+            <a:pPr indent="0" lvl="0" marL="0" rtl="0" algn="l">
+              <a:spcBef>
+                <a:spcPts val="0"/>
+              </a:spcBef>
+              <a:spcAft>
+                <a:spcPts val="0"/>
+              </a:spcAft>
+              <a:buNone/>
+            </a:pPr>
+            <a:r>
+              <a:rPr lang="en"/>
+              <a:t>no</a:t>
+            </a:r>
+            <a:endParaRPr/>
+          </a:p>
+        </p:txBody>
+      </p:sp>
+      <p:sp>
+        <p:nvSpPr>
+          <p:cNvPr id="99" name="Google Shape;99;p15"/>
+          <p:cNvSpPr txBox="1"/>
+          <p:nvPr/>
+        </p:nvSpPr>
+        <p:spPr>
+          <a:xfrm>
+            <a:off x="6279500" y="2240425"/>
+            <a:ext cx="789000" cy="449400"/>
+          </a:xfrm>
+          <a:prstGeom prst="rect">
+            <a:avLst/>
+          </a:prstGeom>
+          <a:noFill/>
+          <a:ln>
+            <a:noFill/>
+          </a:ln>
+        </p:spPr>
+        <p:txBody>
+          <a:bodyPr anchorCtr="0" anchor="t" bIns="91425" lIns="91425" spcFirstLastPara="1" rIns="91425" wrap="square" tIns="91425">
+            <a:noAutofit/>
+          </a:bodyPr>
+          <a:lstStyle/>
+          <a:p>
+            <a:pPr indent="0" lvl="0" marL="0" rtl="0" algn="l">
+              <a:spcBef>
+                <a:spcPts val="0"/>
+              </a:spcBef>
+              <a:spcAft>
+                <a:spcPts val="0"/>
+              </a:spcAft>
+              <a:buNone/>
+            </a:pPr>
+            <a:r>
+              <a:rPr lang="en"/>
+              <a:t>yes</a:t>
+            </a:r>
+            <a:endParaRPr/>
+          </a:p>
+        </p:txBody>
+      </p:sp>
+      <p:sp>
+        <p:nvSpPr>
+          <p:cNvPr id="100" name="Google Shape;100;p15"/>
+          <p:cNvSpPr/>
+          <p:nvPr/>
+        </p:nvSpPr>
+        <p:spPr>
+          <a:xfrm>
+            <a:off x="1972200" y="4331000"/>
+            <a:ext cx="2082600" cy="899400"/>
           </a:xfrm>
           <a:prstGeom prst="roundRect">
             <a:avLst>
@@ -10598,59 +10618,7 @@
             </a:pPr>
             <a:r>
               <a:rPr lang="en"/>
-              <a:t>If no weighbridge is allocated, the user shall use the “reallocate by vehicle” tab in weighbridge management to allocate.</a:t>
-            </a:r>
-            <a:endParaRPr/>
-          </a:p>
-        </p:txBody>
-      </p:sp>
-      <p:sp>
-        <p:nvSpPr>
-          <p:cNvPr id="98" name="Google Shape;98;p17"/>
-          <p:cNvSpPr/>
-          <p:nvPr/>
-        </p:nvSpPr>
-        <p:spPr>
-          <a:xfrm>
-            <a:off x="7789100" y="792350"/>
-            <a:ext cx="1772700" cy="2081700"/>
-          </a:xfrm>
-          <a:prstGeom prst="can">
-            <a:avLst>
-              <a:gd fmla="val 25000" name="adj"/>
-            </a:avLst>
-          </a:prstGeom>
-          <a:solidFill>
-            <a:srgbClr val="6D9EEB"/>
-          </a:solidFill>
-          <a:ln cap="flat" cmpd="sng" w="9525">
-            <a:solidFill>
-              <a:schemeClr val="dk2"/>
-            </a:solidFill>
-            <a:prstDash val="solid"/>
-            <a:round/>
-            <a:headEnd len="sm" w="sm" type="none"/>
-            <a:tailEnd len="sm" w="sm" type="none"/>
-          </a:ln>
-        </p:spPr>
-        <p:txBody>
-          <a:bodyPr anchorCtr="0" anchor="ctr" bIns="91425" lIns="91425" spcFirstLastPara="1" rIns="91425" wrap="square" tIns="91425">
-            <a:noAutofit/>
-          </a:bodyPr>
-          <a:lstStyle/>
-          <a:p>
-            <a:pPr indent="0" lvl="0" marL="0" rtl="0" algn="ctr">
-              <a:spcBef>
-                <a:spcPts val="0"/>
-              </a:spcBef>
-              <a:spcAft>
-                <a:spcPts val="0"/>
-              </a:spcAft>
-              <a:buNone/>
-            </a:pPr>
-            <a:r>
-              <a:rPr lang="en"/>
-              <a:t>DB</a:t>
+              <a:t>User shall view the lists of active external vehicles yet to be weighed.</a:t>
             </a:r>
             <a:endParaRPr/>
           </a:p>
@@ -10658,17 +10626,17 @@
       </p:sp>
       <p:cxnSp>
         <p:nvCxnSpPr>
-          <p:cNvPr id="99" name="Google Shape;99;p17"/>
+          <p:cNvPr id="101" name="Google Shape;101;p15"/>
           <p:cNvCxnSpPr>
-            <a:stCxn id="94" idx="3"/>
-            <a:endCxn id="96" idx="1"/>
+            <a:stCxn id="94" idx="2"/>
+            <a:endCxn id="100" idx="1"/>
           </p:cNvCxnSpPr>
           <p:nvPr/>
         </p:nvCxnSpPr>
         <p:spPr>
           <a:xfrm>
-            <a:off x="2981275" y="1457025"/>
-            <a:ext cx="846000" cy="60600"/>
+            <a:off x="1128150" y="4133725"/>
+            <a:ext cx="844200" cy="647100"/>
           </a:xfrm>
           <a:prstGeom prst="straightConnector1">
             <a:avLst/>
@@ -10687,46 +10655,17 @@
       </p:cxnSp>
       <p:cxnSp>
         <p:nvCxnSpPr>
-          <p:cNvPr id="100" name="Google Shape;100;p17"/>
+          <p:cNvPr id="102" name="Google Shape;102;p15"/>
           <p:cNvCxnSpPr>
-            <a:stCxn id="96" idx="3"/>
-            <a:endCxn id="98" idx="2"/>
-          </p:cNvCxnSpPr>
-          <p:nvPr/>
-        </p:nvCxnSpPr>
-        <p:spPr>
-          <a:xfrm>
-            <a:off x="6378900" y="1517500"/>
-            <a:ext cx="1410300" cy="315600"/>
-          </a:xfrm>
-          <a:prstGeom prst="straightConnector1">
-            <a:avLst/>
-          </a:prstGeom>
-          <a:noFill/>
-          <a:ln cap="flat" cmpd="sng" w="9525">
-            <a:solidFill>
-              <a:schemeClr val="dk2"/>
-            </a:solidFill>
-            <a:prstDash val="solid"/>
-            <a:round/>
-            <a:headEnd len="med" w="med" type="none"/>
-            <a:tailEnd len="med" w="med" type="triangle"/>
-          </a:ln>
-        </p:spPr>
-      </p:cxnSp>
-      <p:cxnSp>
-        <p:nvCxnSpPr>
-          <p:cNvPr id="101" name="Google Shape;101;p17"/>
-          <p:cNvCxnSpPr>
-            <a:stCxn id="97" idx="3"/>
-            <a:endCxn id="98" idx="2"/>
+            <a:stCxn id="100" idx="3"/>
+            <a:endCxn id="95" idx="1"/>
           </p:cNvCxnSpPr>
           <p:nvPr/>
         </p:nvCxnSpPr>
         <p:spPr>
           <a:xfrm flipH="1" rot="10800000">
-            <a:off x="6472950" y="1833250"/>
-            <a:ext cx="1316100" cy="1906800"/>
+            <a:off x="4054800" y="4388300"/>
+            <a:ext cx="962100" cy="392400"/>
           </a:xfrm>
           <a:prstGeom prst="straightConnector1">
             <a:avLst/>

</xml_diff>